<commit_message>
last upgrade of powerpoint
</commit_message>
<xml_diff>
--- a/Carobene_Stefano_ML.pptx
+++ b/Carobene_Stefano_ML.pptx
@@ -9,7 +9,9 @@
     <p:sldId id="257" r:id="rId3"/>
     <p:sldId id="258" r:id="rId4"/>
     <p:sldId id="259" r:id="rId5"/>
-    <p:sldId id="260" r:id="rId6"/>
+    <p:sldId id="261" r:id="rId6"/>
+    <p:sldId id="260" r:id="rId7"/>
+    <p:sldId id="264" r:id="rId8"/>
   </p:sldIdLst>
   <p:sldSz cx="12192000" cy="6858000"/>
   <p:notesSz cx="6858000" cy="9144000"/>
@@ -108,6 +110,11 @@
       </a:defRPr>
     </a:lvl9pPr>
   </p:defaultTextStyle>
+  <p:extLst>
+    <p:ext uri="{EFAFB233-063F-42B5-8137-9DF3F51BA10A}">
+      <p15:sldGuideLst xmlns:p15="http://schemas.microsoft.com/office/powerpoint/2012/main"/>
+    </p:ext>
+  </p:extLst>
 </p:presentation>
 </file>
 
@@ -1034,7 +1041,7 @@
 <dgm:dataModel xmlns:dgm="http://schemas.openxmlformats.org/drawingml/2006/diagram" xmlns:a="http://schemas.openxmlformats.org/drawingml/2006/main">
   <dgm:ptLst>
     <dgm:pt modelId="{2EDE880E-0471-4963-BA2A-0D566BB3AC62}" type="doc">
-      <dgm:prSet loTypeId="urn:microsoft.com/office/officeart/2008/layout/LinedList" loCatId="list" qsTypeId="urn:microsoft.com/office/officeart/2005/8/quickstyle/simple1" qsCatId="simple" csTypeId="urn:microsoft.com/office/officeart/2005/8/colors/colorful1" csCatId="colorful"/>
+      <dgm:prSet loTypeId="urn:microsoft.com/office/officeart/2008/layout/LinedList" loCatId="list" qsTypeId="urn:microsoft.com/office/officeart/2005/8/quickstyle/simple1" qsCatId="simple" csTypeId="urn:microsoft.com/office/officeart/2005/8/colors/colorful1" csCatId="colorful" phldr="1"/>
       <dgm:spPr/>
       <dgm:t>
         <a:bodyPr/>
@@ -1126,10 +1133,10 @@
         <a:lstStyle/>
         <a:p>
           <a:r>
-            <a:rPr lang="it-IT"/>
-            <a:t>Menzione della scarsità dei dati e delle relative sfide affrontate.</a:t>
+            <a:rPr lang="it-IT" dirty="0"/>
+            <a:t>Scarsità dei dati e delle relative sfide affrontate.</a:t>
           </a:r>
-          <a:endParaRPr lang="en-US"/>
+          <a:endParaRPr lang="en-US" dirty="0"/>
         </a:p>
       </dgm:t>
     </dgm:pt>
@@ -1163,10 +1170,10 @@
         <a:lstStyle/>
         <a:p>
           <a:r>
-            <a:rPr lang="it-IT"/>
+            <a:rPr lang="it-IT" dirty="0"/>
             <a:t>Possibili conclusioni o lezioni apprese durante il progetto.</a:t>
           </a:r>
-          <a:endParaRPr lang="en-US"/>
+          <a:endParaRPr lang="en-US" dirty="0"/>
         </a:p>
       </dgm:t>
     </dgm:pt>
@@ -1634,10 +1641,10 @@
             <a:buNone/>
           </a:pPr>
           <a:r>
-            <a:rPr lang="it-IT" sz="3500" kern="1200"/>
-            <a:t>Menzione della scarsità dei dati e delle relative sfide affrontate.</a:t>
+            <a:rPr lang="it-IT" sz="3500" kern="1200" dirty="0"/>
+            <a:t>Scarsità dei dati e delle relative sfide affrontate.</a:t>
           </a:r>
-          <a:endParaRPr lang="en-US" sz="3500" kern="1200"/>
+          <a:endParaRPr lang="en-US" sz="3500" kern="1200" dirty="0"/>
         </a:p>
       </dsp:txBody>
       <dsp:txXfrm>
@@ -1745,10 +1752,10 @@
             <a:buNone/>
           </a:pPr>
           <a:r>
-            <a:rPr lang="it-IT" sz="3500" kern="1200"/>
+            <a:rPr lang="it-IT" sz="3500" kern="1200" dirty="0"/>
             <a:t>Possibili conclusioni o lezioni apprese durante il progetto.</a:t>
           </a:r>
-          <a:endParaRPr lang="en-US" sz="3500" kern="1200"/>
+          <a:endParaRPr lang="en-US" sz="3500" kern="1200" dirty="0"/>
         </a:p>
       </dsp:txBody>
       <dsp:txXfrm>
@@ -3407,7 +3414,7 @@
           <a:p>
             <a:fld id="{8721A4F7-F570-4841-B762-C31F9625FB38}" type="datetimeFigureOut">
               <a:rPr lang="en-US" smtClean="0"/>
-              <a:t>11/28/2023</a:t>
+              <a:t>11/29/2023</a:t>
             </a:fld>
             <a:endParaRPr lang="en-US"/>
           </a:p>
@@ -3605,7 +3612,7 @@
           <a:p>
             <a:fld id="{8721A4F7-F570-4841-B762-C31F9625FB38}" type="datetimeFigureOut">
               <a:rPr lang="en-US" smtClean="0"/>
-              <a:t>11/28/2023</a:t>
+              <a:t>11/29/2023</a:t>
             </a:fld>
             <a:endParaRPr lang="en-US"/>
           </a:p>
@@ -3813,7 +3820,7 @@
           <a:p>
             <a:fld id="{8721A4F7-F570-4841-B762-C31F9625FB38}" type="datetimeFigureOut">
               <a:rPr lang="en-US" smtClean="0"/>
-              <a:t>11/28/2023</a:t>
+              <a:t>11/29/2023</a:t>
             </a:fld>
             <a:endParaRPr lang="en-US"/>
           </a:p>
@@ -4011,7 +4018,7 @@
           <a:p>
             <a:fld id="{8721A4F7-F570-4841-B762-C31F9625FB38}" type="datetimeFigureOut">
               <a:rPr lang="en-US" smtClean="0"/>
-              <a:t>11/28/2023</a:t>
+              <a:t>11/29/2023</a:t>
             </a:fld>
             <a:endParaRPr lang="en-US"/>
           </a:p>
@@ -4286,7 +4293,7 @@
           <a:p>
             <a:fld id="{8721A4F7-F570-4841-B762-C31F9625FB38}" type="datetimeFigureOut">
               <a:rPr lang="en-US" smtClean="0"/>
-              <a:t>11/28/2023</a:t>
+              <a:t>11/29/2023</a:t>
             </a:fld>
             <a:endParaRPr lang="en-US"/>
           </a:p>
@@ -4551,7 +4558,7 @@
           <a:p>
             <a:fld id="{8721A4F7-F570-4841-B762-C31F9625FB38}" type="datetimeFigureOut">
               <a:rPr lang="en-US" smtClean="0"/>
-              <a:t>11/28/2023</a:t>
+              <a:t>11/29/2023</a:t>
             </a:fld>
             <a:endParaRPr lang="en-US"/>
           </a:p>
@@ -4963,7 +4970,7 @@
           <a:p>
             <a:fld id="{8721A4F7-F570-4841-B762-C31F9625FB38}" type="datetimeFigureOut">
               <a:rPr lang="en-US" smtClean="0"/>
-              <a:t>11/28/2023</a:t>
+              <a:t>11/29/2023</a:t>
             </a:fld>
             <a:endParaRPr lang="en-US"/>
           </a:p>
@@ -5104,7 +5111,7 @@
           <a:p>
             <a:fld id="{8721A4F7-F570-4841-B762-C31F9625FB38}" type="datetimeFigureOut">
               <a:rPr lang="en-US" smtClean="0"/>
-              <a:t>11/28/2023</a:t>
+              <a:t>11/29/2023</a:t>
             </a:fld>
             <a:endParaRPr lang="en-US"/>
           </a:p>
@@ -5217,7 +5224,7 @@
           <a:p>
             <a:fld id="{8721A4F7-F570-4841-B762-C31F9625FB38}" type="datetimeFigureOut">
               <a:rPr lang="en-US" smtClean="0"/>
-              <a:t>11/28/2023</a:t>
+              <a:t>11/29/2023</a:t>
             </a:fld>
             <a:endParaRPr lang="en-US"/>
           </a:p>
@@ -5528,7 +5535,7 @@
           <a:p>
             <a:fld id="{8721A4F7-F570-4841-B762-C31F9625FB38}" type="datetimeFigureOut">
               <a:rPr lang="en-US" smtClean="0"/>
-              <a:t>11/28/2023</a:t>
+              <a:t>11/29/2023</a:t>
             </a:fld>
             <a:endParaRPr lang="en-US"/>
           </a:p>
@@ -5816,7 +5823,7 @@
           <a:p>
             <a:fld id="{8721A4F7-F570-4841-B762-C31F9625FB38}" type="datetimeFigureOut">
               <a:rPr lang="en-US" smtClean="0"/>
-              <a:t>11/28/2023</a:t>
+              <a:t>11/29/2023</a:t>
             </a:fld>
             <a:endParaRPr lang="en-US"/>
           </a:p>
@@ -6057,7 +6064,7 @@
           <a:p>
             <a:fld id="{8721A4F7-F570-4841-B762-C31F9625FB38}" type="datetimeFigureOut">
               <a:rPr lang="en-US" smtClean="0"/>
-              <a:t>11/28/2023</a:t>
+              <a:t>11/29/2023</a:t>
             </a:fld>
             <a:endParaRPr lang="en-US"/>
           </a:p>
@@ -6733,29 +6740,37 @@
           <a:lstStyle/>
           <a:p>
             <a:r>
-              <a:rPr lang="it-IT" sz="6600">
+              <a:rPr lang="it-IT" sz="6600" dirty="0">
                 <a:solidFill>
                   <a:srgbClr val="FFFFFF"/>
                 </a:solidFill>
               </a:rPr>
-              <a:t>Speech Recognition</a:t>
+              <a:t>Speech </a:t>
+            </a:r>
+            <a:r>
+              <a:rPr lang="it-IT" sz="6600" dirty="0" err="1">
+                <a:solidFill>
+                  <a:srgbClr val="FFFFFF"/>
+                </a:solidFill>
+              </a:rPr>
+              <a:t>Recognition</a:t>
             </a:r>
             <a:br>
-              <a:rPr lang="it-IT" sz="6600">
+              <a:rPr lang="it-IT" sz="6600" dirty="0">
                 <a:solidFill>
                   <a:srgbClr val="FFFFFF"/>
                 </a:solidFill>
               </a:rPr>
             </a:br>
             <a:r>
-              <a:rPr lang="it-IT" sz="6600">
+              <a:rPr lang="it-IT" sz="6600" dirty="0">
                 <a:solidFill>
                   <a:srgbClr val="FFFFFF"/>
                 </a:solidFill>
               </a:rPr>
               <a:t>(Speech-to-Text)</a:t>
             </a:r>
-            <a:endParaRPr lang="en-US" sz="6600">
+            <a:endParaRPr lang="en-US" sz="6600" dirty="0">
               <a:solidFill>
                 <a:srgbClr val="FFFFFF"/>
               </a:solidFill>
@@ -7741,8 +7756,20 @@
               <a:buNone/>
             </a:pPr>
             <a:r>
-              <a:rPr lang="it-IT" sz="2200"/>
-              <a:t>TensorFlow ha rilasciato il dataset "Speech Commands" che include 64,000 frasi di un secondo contenenti 30 parole, pronunciate da migliaia di persone diverse.</a:t>
+              <a:rPr lang="it-IT" sz="2200" dirty="0" err="1"/>
+              <a:t>TensorFlow</a:t>
+            </a:r>
+            <a:r>
+              <a:rPr lang="it-IT" sz="2200" dirty="0"/>
+              <a:t> ha rilasciato il dataset "Speech </a:t>
+            </a:r>
+            <a:r>
+              <a:rPr lang="it-IT" sz="2200" dirty="0" err="1"/>
+              <a:t>Commands</a:t>
+            </a:r>
+            <a:r>
+              <a:rPr lang="it-IT" sz="2200" dirty="0"/>
+              <a:t>" che include 64,000 audio di un secondo contenenti 30 parole, pronunciate da un migliaio di persone diverse.</a:t>
             </a:r>
           </a:p>
         </p:txBody>
@@ -8252,28 +8279,76 @@
           <a:lstStyle/>
           <a:p>
             <a:r>
-              <a:rPr lang="it-IT" sz="2200"/>
-              <a:t>Modello di rete neurale convoluzionale (CNN) per il riconoscimento del linguaggio.</a:t>
+              <a:rPr lang="it-IT" sz="2200" dirty="0"/>
+              <a:t>Modello di rete neurale </a:t>
             </a:r>
-          </a:p>
-          <a:p>
             <a:r>
-              <a:rPr lang="it-IT" sz="2200"/>
+              <a:rPr lang="it-IT" sz="2200" dirty="0" err="1"/>
+              <a:t>convoluzionale</a:t>
+            </a:r>
+            <a:r>
+              <a:rPr lang="it-IT" sz="2200" dirty="0"/>
+              <a:t> (CNN) per il riconoscimento del linguaggio.</a:t>
+            </a:r>
+          </a:p>
+          <a:p>
+            <a:r>
+              <a:rPr lang="it-IT" sz="2200" dirty="0"/>
               <a:t>Architettura del modello con strati Conv1D, MaxPooling1D, e Dense.</a:t>
             </a:r>
           </a:p>
           <a:p>
             <a:r>
-              <a:rPr lang="it-IT" sz="2200"/>
-              <a:t>Utilizzo di funzione di attivazione 'relu', ottimizzatore 'adam', e metrica di valutazione 'accuracy'.</a:t>
+              <a:rPr lang="it-IT" sz="2200" dirty="0"/>
+              <a:t>Utilizzo di funzione di attivazione 'relu', ottimizzatore '</a:t>
             </a:r>
-          </a:p>
-          <a:p>
             <a:r>
-              <a:rPr lang="it-IT" sz="2200"/>
-              <a:t>Addestramento del modello con tecniche come Early Stopping e Model Checkpoint.</a:t>
+              <a:rPr lang="it-IT" sz="2200" dirty="0" err="1"/>
+              <a:t>adam</a:t>
             </a:r>
-            <a:endParaRPr lang="en-US" sz="2200"/>
+            <a:r>
+              <a:rPr lang="it-IT" sz="2200" dirty="0"/>
+              <a:t>', e metrica di valutazione '</a:t>
+            </a:r>
+            <a:r>
+              <a:rPr lang="it-IT" sz="2200" dirty="0" err="1"/>
+              <a:t>accuracy</a:t>
+            </a:r>
+            <a:r>
+              <a:rPr lang="it-IT" sz="2200" dirty="0"/>
+              <a:t>'.</a:t>
+            </a:r>
+          </a:p>
+          <a:p>
+            <a:r>
+              <a:rPr lang="it-IT" sz="2200" dirty="0"/>
+              <a:t>Addestramento del modello con diversi </a:t>
+            </a:r>
+            <a:r>
+              <a:rPr lang="it-IT" sz="2200" dirty="0" err="1"/>
+              <a:t>callbacks</a:t>
+            </a:r>
+            <a:r>
+              <a:rPr lang="it-IT" sz="2200" dirty="0"/>
+              <a:t> come </a:t>
+            </a:r>
+            <a:r>
+              <a:rPr lang="it-IT" sz="2200" dirty="0" err="1"/>
+              <a:t>Early</a:t>
+            </a:r>
+            <a:r>
+              <a:rPr lang="it-IT" sz="2200" dirty="0"/>
+              <a:t> </a:t>
+            </a:r>
+            <a:r>
+              <a:rPr lang="it-IT" sz="2200" dirty="0" err="1"/>
+              <a:t>Stopping</a:t>
+            </a:r>
+            <a:r>
+              <a:rPr lang="it-IT" sz="2200" dirty="0"/>
+              <a:t> e Model Checkpoint.</a:t>
+            </a:r>
+            <a:endParaRPr lang="en-US" sz="2200" dirty="0"/>
           </a:p>
         </p:txBody>
       </p:sp>
@@ -8862,6 +8937,1971 @@
       </p:grpSpPr>
       <p:sp useBgFill="1">
         <p:nvSpPr>
+          <p:cNvPr id="12" name="Rectangle 11">
+            <a:extLst>
+              <a:ext uri="{FF2B5EF4-FFF2-40B4-BE49-F238E27FC236}">
+                <a16:creationId xmlns:a16="http://schemas.microsoft.com/office/drawing/2014/main" id="{131BAD53-4E89-4F62-BBB7-26359763ED39}"/>
+              </a:ext>
+              <a:ext uri="{C183D7F6-B498-43B3-948B-1728B52AA6E4}">
+                <adec:decorative xmlns:adec="http://schemas.microsoft.com/office/drawing/2017/decorative" val="1"/>
+              </a:ext>
+            </a:extLst>
+          </p:cNvPr>
+          <p:cNvSpPr>
+            <a:spLocks noGrp="1" noRot="1" noChangeAspect="1" noMove="1" noResize="1" noEditPoints="1" noAdjustHandles="1" noChangeArrowheads="1" noChangeShapeType="1" noTextEdit="1"/>
+          </p:cNvSpPr>
+          <p:nvPr>
+            <p:extLst>
+              <p:ext uri="{386F3935-93C4-4BCD-93E2-E3B085C9AB24}">
+                <p16:designElem xmlns:p16="http://schemas.microsoft.com/office/powerpoint/2015/main" val="1"/>
+              </p:ext>
+            </p:extLst>
+          </p:nvPr>
+        </p:nvSpPr>
+        <p:spPr>
+          <a:xfrm>
+            <a:off x="0" y="0"/>
+            <a:ext cx="12192000" cy="6858000"/>
+          </a:xfrm>
+          <a:prstGeom prst="rect">
+            <a:avLst/>
+          </a:prstGeom>
+          <a:ln w="12700" cap="flat" cmpd="sng" algn="ctr">
+            <a:noFill/>
+            <a:prstDash val="solid"/>
+            <a:miter lim="800000"/>
+          </a:ln>
+          <a:effectLst/>
+          <a:extLst>
+            <a:ext uri="{91240B29-F687-4F45-9708-019B960494DF}">
+              <a14:hiddenLine xmlns:a14="http://schemas.microsoft.com/office/drawing/2010/main" w="12700" cap="flat" cmpd="sng" algn="ctr">
+                <a:solidFill>
+                  <a:schemeClr val="accent1">
+                    <a:shade val="50000"/>
+                  </a:schemeClr>
+                </a:solidFill>
+                <a:prstDash val="solid"/>
+                <a:miter lim="800000"/>
+              </a14:hiddenLine>
+            </a:ext>
+          </a:extLst>
+        </p:spPr>
+        <p:style>
+          <a:lnRef idx="2">
+            <a:schemeClr val="accent1">
+              <a:shade val="50000"/>
+            </a:schemeClr>
+          </a:lnRef>
+          <a:fillRef idx="1">
+            <a:schemeClr val="accent1"/>
+          </a:fillRef>
+          <a:effectRef idx="0">
+            <a:schemeClr val="accent1"/>
+          </a:effectRef>
+          <a:fontRef idx="minor">
+            <a:schemeClr val="lt1"/>
+          </a:fontRef>
+        </p:style>
+        <p:txBody>
+          <a:bodyPr rtlCol="0" anchor="ctr"/>
+          <a:lstStyle/>
+          <a:p>
+            <a:pPr algn="ctr"/>
+            <a:endParaRPr lang="en-US"/>
+          </a:p>
+        </p:txBody>
+      </p:sp>
+      <p:sp>
+        <p:nvSpPr>
+          <p:cNvPr id="14" name="Freeform: Shape 13">
+            <a:extLst>
+              <a:ext uri="{FF2B5EF4-FFF2-40B4-BE49-F238E27FC236}">
+                <a16:creationId xmlns:a16="http://schemas.microsoft.com/office/drawing/2014/main" id="{62756DA2-40EB-4C6F-B962-5822FFB54FB6}"/>
+              </a:ext>
+              <a:ext uri="{C183D7F6-B498-43B3-948B-1728B52AA6E4}">
+                <adec:decorative xmlns:adec="http://schemas.microsoft.com/office/drawing/2017/decorative" val="1"/>
+              </a:ext>
+            </a:extLst>
+          </p:cNvPr>
+          <p:cNvSpPr>
+            <a:spLocks noGrp="1" noRot="1" noChangeAspect="1" noMove="1" noResize="1" noEditPoints="1" noAdjustHandles="1" noChangeArrowheads="1" noChangeShapeType="1" noTextEdit="1"/>
+          </p:cNvSpPr>
+          <p:nvPr>
+            <p:extLst>
+              <p:ext uri="{386F3935-93C4-4BCD-93E2-E3B085C9AB24}">
+                <p16:designElem xmlns:p16="http://schemas.microsoft.com/office/powerpoint/2015/main" val="1"/>
+              </p:ext>
+            </p:extLst>
+          </p:nvPr>
+        </p:nvSpPr>
+        <p:spPr>
+          <a:xfrm>
+            <a:off x="0" y="0"/>
+            <a:ext cx="5653438" cy="6858000"/>
+          </a:xfrm>
+          <a:custGeom>
+            <a:avLst/>
+            <a:gdLst>
+              <a:gd name="connsiteX0" fmla="*/ 0 w 6096000"/>
+              <a:gd name="connsiteY0" fmla="*/ 0 h 6858000"/>
+              <a:gd name="connsiteX1" fmla="*/ 5567517 w 6096000"/>
+              <a:gd name="connsiteY1" fmla="*/ 0 h 6858000"/>
+              <a:gd name="connsiteX2" fmla="*/ 5566938 w 6096000"/>
+              <a:gd name="connsiteY2" fmla="*/ 1705 h 6858000"/>
+              <a:gd name="connsiteX3" fmla="*/ 5551594 w 6096000"/>
+              <a:gd name="connsiteY3" fmla="*/ 17287 h 6858000"/>
+              <a:gd name="connsiteX4" fmla="*/ 5545641 w 6096000"/>
+              <a:gd name="connsiteY4" fmla="*/ 130336 h 6858000"/>
+              <a:gd name="connsiteX5" fmla="*/ 5538289 w 6096000"/>
+              <a:gd name="connsiteY5" fmla="*/ 187093 h 6858000"/>
+              <a:gd name="connsiteX6" fmla="*/ 5545790 w 6096000"/>
+              <a:gd name="connsiteY6" fmla="*/ 265704 h 6858000"/>
+              <a:gd name="connsiteX7" fmla="*/ 5542313 w 6096000"/>
+              <a:gd name="connsiteY7" fmla="*/ 354566 h 6858000"/>
+              <a:gd name="connsiteX8" fmla="*/ 5524126 w 6096000"/>
+              <a:gd name="connsiteY8" fmla="*/ 472000 h 6858000"/>
+              <a:gd name="connsiteX9" fmla="*/ 5522170 w 6096000"/>
+              <a:gd name="connsiteY9" fmla="*/ 473782 h 6858000"/>
+              <a:gd name="connsiteX10" fmla="*/ 5521798 w 6096000"/>
+              <a:gd name="connsiteY10" fmla="*/ 491380 h 6858000"/>
+              <a:gd name="connsiteX11" fmla="*/ 5536419 w 6096000"/>
+              <a:gd name="connsiteY11" fmla="*/ 531675 h 6858000"/>
+              <a:gd name="connsiteX12" fmla="*/ 5533435 w 6096000"/>
+              <a:gd name="connsiteY12" fmla="*/ 536015 h 6858000"/>
+              <a:gd name="connsiteX13" fmla="*/ 5538088 w 6096000"/>
+              <a:gd name="connsiteY13" fmla="*/ 572092 h 6858000"/>
+              <a:gd name="connsiteX14" fmla="*/ 5536061 w 6096000"/>
+              <a:gd name="connsiteY14" fmla="*/ 572511 h 6858000"/>
+              <a:gd name="connsiteX15" fmla="*/ 5528218 w 6096000"/>
+              <a:gd name="connsiteY15" fmla="*/ 582332 h 6858000"/>
+              <a:gd name="connsiteX16" fmla="*/ 5518011 w 6096000"/>
+              <a:gd name="connsiteY16" fmla="*/ 601285 h 6858000"/>
+              <a:gd name="connsiteX17" fmla="*/ 5473174 w 6096000"/>
+              <a:gd name="connsiteY17" fmla="*/ 681608 h 6858000"/>
+              <a:gd name="connsiteX18" fmla="*/ 5472963 w 6096000"/>
+              <a:gd name="connsiteY18" fmla="*/ 689151 h 6858000"/>
+              <a:gd name="connsiteX19" fmla="*/ 5472485 w 6096000"/>
+              <a:gd name="connsiteY19" fmla="*/ 689289 h 6858000"/>
+              <a:gd name="connsiteX20" fmla="*/ 5471326 w 6096000"/>
+              <a:gd name="connsiteY20" fmla="*/ 697222 h 6858000"/>
+              <a:gd name="connsiteX21" fmla="*/ 5472164 w 6096000"/>
+              <a:gd name="connsiteY21" fmla="*/ 717531 h 6858000"/>
+              <a:gd name="connsiteX22" fmla="*/ 5468891 w 6096000"/>
+              <a:gd name="connsiteY22" fmla="*/ 722494 h 6858000"/>
+              <a:gd name="connsiteX23" fmla="*/ 5463081 w 6096000"/>
+              <a:gd name="connsiteY23" fmla="*/ 724368 h 6858000"/>
+              <a:gd name="connsiteX24" fmla="*/ 5446981 w 6096000"/>
+              <a:gd name="connsiteY24" fmla="*/ 752692 h 6858000"/>
+              <a:gd name="connsiteX25" fmla="*/ 5417190 w 6096000"/>
+              <a:gd name="connsiteY25" fmla="*/ 816346 h 6858000"/>
+              <a:gd name="connsiteX26" fmla="*/ 5388958 w 6096000"/>
+              <a:gd name="connsiteY26" fmla="*/ 889417 h 6858000"/>
+              <a:gd name="connsiteX27" fmla="*/ 5307044 w 6096000"/>
+              <a:gd name="connsiteY27" fmla="*/ 1063288 h 6858000"/>
+              <a:gd name="connsiteX28" fmla="*/ 5303837 w 6096000"/>
+              <a:gd name="connsiteY28" fmla="*/ 1157176 h 6858000"/>
+              <a:gd name="connsiteX29" fmla="*/ 5286494 w 6096000"/>
+              <a:gd name="connsiteY29" fmla="*/ 1210776 h 6858000"/>
+              <a:gd name="connsiteX30" fmla="*/ 5282463 w 6096000"/>
+              <a:gd name="connsiteY30" fmla="*/ 1301993 h 6858000"/>
+              <a:gd name="connsiteX31" fmla="*/ 5252235 w 6096000"/>
+              <a:gd name="connsiteY31" fmla="*/ 1360879 h 6858000"/>
+              <a:gd name="connsiteX32" fmla="*/ 5244497 w 6096000"/>
+              <a:gd name="connsiteY32" fmla="*/ 1404045 h 6858000"/>
+              <a:gd name="connsiteX33" fmla="*/ 5223823 w 6096000"/>
+              <a:gd name="connsiteY33" fmla="*/ 1429568 h 6858000"/>
+              <a:gd name="connsiteX34" fmla="*/ 5224851 w 6096000"/>
+              <a:gd name="connsiteY34" fmla="*/ 1430305 h 6858000"/>
+              <a:gd name="connsiteX35" fmla="*/ 5212394 w 6096000"/>
+              <a:gd name="connsiteY35" fmla="*/ 1463304 h 6858000"/>
+              <a:gd name="connsiteX36" fmla="*/ 5209958 w 6096000"/>
+              <a:gd name="connsiteY36" fmla="*/ 1514846 h 6858000"/>
+              <a:gd name="connsiteX37" fmla="*/ 5206417 w 6096000"/>
+              <a:gd name="connsiteY37" fmla="*/ 1519731 h 6858000"/>
+              <a:gd name="connsiteX38" fmla="*/ 5206640 w 6096000"/>
+              <a:gd name="connsiteY38" fmla="*/ 1519929 h 6858000"/>
+              <a:gd name="connsiteX39" fmla="*/ 5207632 w 6096000"/>
+              <a:gd name="connsiteY39" fmla="*/ 1546022 h 6858000"/>
+              <a:gd name="connsiteX40" fmla="*/ 5212030 w 6096000"/>
+              <a:gd name="connsiteY40" fmla="*/ 1578752 h 6858000"/>
+              <a:gd name="connsiteX41" fmla="*/ 5203533 w 6096000"/>
+              <a:gd name="connsiteY41" fmla="*/ 1647555 h 6858000"/>
+              <a:gd name="connsiteX42" fmla="*/ 5190877 w 6096000"/>
+              <a:gd name="connsiteY42" fmla="*/ 1715685 h 6858000"/>
+              <a:gd name="connsiteX43" fmla="*/ 5184235 w 6096000"/>
+              <a:gd name="connsiteY43" fmla="*/ 1740358 h 6858000"/>
+              <a:gd name="connsiteX44" fmla="*/ 5181475 w 6096000"/>
+              <a:gd name="connsiteY44" fmla="*/ 1784314 h 6858000"/>
+              <a:gd name="connsiteX45" fmla="*/ 5185845 w 6096000"/>
+              <a:gd name="connsiteY45" fmla="*/ 1804434 h 6858000"/>
+              <a:gd name="connsiteX46" fmla="*/ 5185068 w 6096000"/>
+              <a:gd name="connsiteY46" fmla="*/ 1805316 h 6858000"/>
+              <a:gd name="connsiteX47" fmla="*/ 5188593 w 6096000"/>
+              <a:gd name="connsiteY47" fmla="*/ 1807109 h 6858000"/>
+              <a:gd name="connsiteX48" fmla="*/ 5185920 w 6096000"/>
+              <a:gd name="connsiteY48" fmla="*/ 1821003 h 6858000"/>
+              <a:gd name="connsiteX49" fmla="*/ 5183543 w 6096000"/>
+              <a:gd name="connsiteY49" fmla="*/ 1824832 h 6858000"/>
+              <a:gd name="connsiteX50" fmla="*/ 5182235 w 6096000"/>
+              <a:gd name="connsiteY50" fmla="*/ 1830429 h 6858000"/>
+              <a:gd name="connsiteX51" fmla="*/ 5182525 w 6096000"/>
+              <a:gd name="connsiteY51" fmla="*/ 1830569 h 6858000"/>
+              <a:gd name="connsiteX52" fmla="*/ 5180663 w 6096000"/>
+              <a:gd name="connsiteY52" fmla="*/ 1835810 h 6858000"/>
+              <a:gd name="connsiteX53" fmla="*/ 5167452 w 6096000"/>
+              <a:gd name="connsiteY53" fmla="*/ 1861483 h 6858000"/>
+              <a:gd name="connsiteX54" fmla="*/ 5174266 w 6096000"/>
+              <a:gd name="connsiteY54" fmla="*/ 1892417 h 6858000"/>
+              <a:gd name="connsiteX55" fmla="*/ 5189262 w 6096000"/>
+              <a:gd name="connsiteY55" fmla="*/ 1895114 h 6858000"/>
+              <a:gd name="connsiteX56" fmla="*/ 5187100 w 6096000"/>
+              <a:gd name="connsiteY56" fmla="*/ 1899379 h 6858000"/>
+              <a:gd name="connsiteX57" fmla="*/ 5180471 w 6096000"/>
+              <a:gd name="connsiteY57" fmla="*/ 1907867 h 6858000"/>
+              <a:gd name="connsiteX58" fmla="*/ 5181361 w 6096000"/>
+              <a:gd name="connsiteY58" fmla="*/ 1910265 h 6858000"/>
+              <a:gd name="connsiteX59" fmla="*/ 5178268 w 6096000"/>
+              <a:gd name="connsiteY59" fmla="*/ 1935584 h 6858000"/>
+              <a:gd name="connsiteX60" fmla="*/ 5183619 w 6096000"/>
+              <a:gd name="connsiteY60" fmla="*/ 1942021 h 6858000"/>
+              <a:gd name="connsiteX61" fmla="*/ 5184480 w 6096000"/>
+              <a:gd name="connsiteY61" fmla="*/ 1945112 h 6858000"/>
+              <a:gd name="connsiteX62" fmla="*/ 5172776 w 6096000"/>
+              <a:gd name="connsiteY62" fmla="*/ 1961162 h 6858000"/>
+              <a:gd name="connsiteX63" fmla="*/ 5168513 w 6096000"/>
+              <a:gd name="connsiteY63" fmla="*/ 1969445 h 6858000"/>
+              <a:gd name="connsiteX64" fmla="*/ 5126597 w 6096000"/>
+              <a:gd name="connsiteY64" fmla="*/ 2024270 h 6858000"/>
+              <a:gd name="connsiteX65" fmla="*/ 5119528 w 6096000"/>
+              <a:gd name="connsiteY65" fmla="*/ 2107942 h 6858000"/>
+              <a:gd name="connsiteX66" fmla="*/ 5110356 w 6096000"/>
+              <a:gd name="connsiteY66" fmla="*/ 2193455 h 6858000"/>
+              <a:gd name="connsiteX67" fmla="*/ 5104992 w 6096000"/>
+              <a:gd name="connsiteY67" fmla="*/ 2260088 h 6858000"/>
+              <a:gd name="connsiteX68" fmla="*/ 5059439 w 6096000"/>
+              <a:gd name="connsiteY68" fmla="*/ 2335735 h 6858000"/>
+              <a:gd name="connsiteX69" fmla="*/ 5022061 w 6096000"/>
+              <a:gd name="connsiteY69" fmla="*/ 2408995 h 6858000"/>
+              <a:gd name="connsiteX70" fmla="*/ 5022253 w 6096000"/>
+              <a:gd name="connsiteY70" fmla="*/ 2445869 h 6858000"/>
+              <a:gd name="connsiteX71" fmla="*/ 5011426 w 6096000"/>
+              <a:gd name="connsiteY71" fmla="*/ 2496499 h 6858000"/>
+              <a:gd name="connsiteX72" fmla="*/ 4994224 w 6096000"/>
+              <a:gd name="connsiteY72" fmla="*/ 2549900 h 6858000"/>
+              <a:gd name="connsiteX73" fmla="*/ 4995245 w 6096000"/>
+              <a:gd name="connsiteY73" fmla="*/ 2596456 h 6858000"/>
+              <a:gd name="connsiteX74" fmla="*/ 4988570 w 6096000"/>
+              <a:gd name="connsiteY74" fmla="*/ 2606088 h 6858000"/>
+              <a:gd name="connsiteX75" fmla="*/ 4988371 w 6096000"/>
+              <a:gd name="connsiteY75" fmla="*/ 2635351 h 6858000"/>
+              <a:gd name="connsiteX76" fmla="*/ 4983212 w 6096000"/>
+              <a:gd name="connsiteY76" fmla="*/ 2665666 h 6858000"/>
+              <a:gd name="connsiteX77" fmla="*/ 4968234 w 6096000"/>
+              <a:gd name="connsiteY77" fmla="*/ 2715895 h 6858000"/>
+              <a:gd name="connsiteX78" fmla="*/ 4975888 w 6096000"/>
+              <a:gd name="connsiteY78" fmla="*/ 2725052 h 6858000"/>
+              <a:gd name="connsiteX79" fmla="*/ 4980195 w 6096000"/>
+              <a:gd name="connsiteY79" fmla="*/ 2726489 h 6858000"/>
+              <a:gd name="connsiteX80" fmla="*/ 4976218 w 6096000"/>
+              <a:gd name="connsiteY80" fmla="*/ 2740278 h 6858000"/>
+              <a:gd name="connsiteX81" fmla="*/ 4980571 w 6096000"/>
+              <a:gd name="connsiteY81" fmla="*/ 2751112 h 6858000"/>
+              <a:gd name="connsiteX82" fmla="*/ 4973893 w 6096000"/>
+              <a:gd name="connsiteY82" fmla="*/ 2760208 h 6858000"/>
+              <a:gd name="connsiteX83" fmla="*/ 4979005 w 6096000"/>
+              <a:gd name="connsiteY83" fmla="*/ 2790136 h 6858000"/>
+              <a:gd name="connsiteX84" fmla="*/ 4986137 w 6096000"/>
+              <a:gd name="connsiteY84" fmla="*/ 2804183 h 6858000"/>
+              <a:gd name="connsiteX85" fmla="*/ 4986175 w 6096000"/>
+              <a:gd name="connsiteY85" fmla="*/ 2825860 h 6858000"/>
+              <a:gd name="connsiteX86" fmla="*/ 4993936 w 6096000"/>
+              <a:gd name="connsiteY86" fmla="*/ 2911749 h 6858000"/>
+              <a:gd name="connsiteX87" fmla="*/ 4992563 w 6096000"/>
+              <a:gd name="connsiteY87" fmla="*/ 2977278 h 6858000"/>
+              <a:gd name="connsiteX88" fmla="*/ 4980516 w 6096000"/>
+              <a:gd name="connsiteY88" fmla="*/ 2991092 h 6858000"/>
+              <a:gd name="connsiteX89" fmla="*/ 4992801 w 6096000"/>
+              <a:gd name="connsiteY89" fmla="*/ 3020247 h 6858000"/>
+              <a:gd name="connsiteX90" fmla="*/ 5014805 w 6096000"/>
+              <a:gd name="connsiteY90" fmla="*/ 3065434 h 6858000"/>
+              <a:gd name="connsiteX91" fmla="*/ 5002733 w 6096000"/>
+              <a:gd name="connsiteY91" fmla="*/ 3103777 h 6858000"/>
+              <a:gd name="connsiteX92" fmla="*/ 5002941 w 6096000"/>
+              <a:gd name="connsiteY92" fmla="*/ 3151828 h 6858000"/>
+              <a:gd name="connsiteX93" fmla="*/ 5002883 w 6096000"/>
+              <a:gd name="connsiteY93" fmla="*/ 3180546 h 6858000"/>
+              <a:gd name="connsiteX94" fmla="*/ 5016711 w 6096000"/>
+              <a:gd name="connsiteY94" fmla="*/ 3258677 h 6858000"/>
+              <a:gd name="connsiteX95" fmla="*/ 5017918 w 6096000"/>
+              <a:gd name="connsiteY95" fmla="*/ 3262610 h 6858000"/>
+              <a:gd name="connsiteX96" fmla="*/ 5011672 w 6096000"/>
+              <a:gd name="connsiteY96" fmla="*/ 3277179 h 6858000"/>
+              <a:gd name="connsiteX97" fmla="*/ 5009344 w 6096000"/>
+              <a:gd name="connsiteY97" fmla="*/ 3278130 h 6858000"/>
+              <a:gd name="connsiteX98" fmla="*/ 5026770 w 6096000"/>
+              <a:gd name="connsiteY98" fmla="*/ 3325671 h 6858000"/>
+              <a:gd name="connsiteX99" fmla="*/ 5024571 w 6096000"/>
+              <a:gd name="connsiteY99" fmla="*/ 3332072 h 6858000"/>
+              <a:gd name="connsiteX100" fmla="*/ 5041705 w 6096000"/>
+              <a:gd name="connsiteY100" fmla="*/ 3362948 h 6858000"/>
+              <a:gd name="connsiteX101" fmla="*/ 5047477 w 6096000"/>
+              <a:gd name="connsiteY101" fmla="*/ 3378959 h 6858000"/>
+              <a:gd name="connsiteX102" fmla="*/ 5060758 w 6096000"/>
+              <a:gd name="connsiteY102" fmla="*/ 3407057 h 6858000"/>
+              <a:gd name="connsiteX103" fmla="*/ 5058968 w 6096000"/>
+              <a:gd name="connsiteY103" fmla="*/ 3409825 h 6858000"/>
+              <a:gd name="connsiteX104" fmla="*/ 5062667 w 6096000"/>
+              <a:gd name="connsiteY104" fmla="*/ 3415218 h 6858000"/>
+              <a:gd name="connsiteX105" fmla="*/ 5060928 w 6096000"/>
+              <a:gd name="connsiteY105" fmla="*/ 3419880 h 6858000"/>
+              <a:gd name="connsiteX106" fmla="*/ 5062923 w 6096000"/>
+              <a:gd name="connsiteY106" fmla="*/ 3424545 h 6858000"/>
+              <a:gd name="connsiteX107" fmla="*/ 5064623 w 6096000"/>
+              <a:gd name="connsiteY107" fmla="*/ 3476412 h 6858000"/>
+              <a:gd name="connsiteX108" fmla="*/ 5069684 w 6096000"/>
+              <a:gd name="connsiteY108" fmla="*/ 3486850 h 6858000"/>
+              <a:gd name="connsiteX109" fmla="*/ 5063339 w 6096000"/>
+              <a:gd name="connsiteY109" fmla="*/ 3496391 h 6858000"/>
+              <a:gd name="connsiteX110" fmla="*/ 5070139 w 6096000"/>
+              <a:gd name="connsiteY110" fmla="*/ 3531201 h 6858000"/>
+              <a:gd name="connsiteX111" fmla="*/ 5079896 w 6096000"/>
+              <a:gd name="connsiteY111" fmla="*/ 3542019 h 6858000"/>
+              <a:gd name="connsiteX112" fmla="*/ 5087540 w 6096000"/>
+              <a:gd name="connsiteY112" fmla="*/ 3552249 h 6858000"/>
+              <a:gd name="connsiteX113" fmla="*/ 5087902 w 6096000"/>
+              <a:gd name="connsiteY113" fmla="*/ 3553678 h 6858000"/>
+              <a:gd name="connsiteX114" fmla="*/ 5091509 w 6096000"/>
+              <a:gd name="connsiteY114" fmla="*/ 3568021 h 6858000"/>
+              <a:gd name="connsiteX115" fmla="*/ 5091934 w 6096000"/>
+              <a:gd name="connsiteY115" fmla="*/ 3569719 h 6858000"/>
+              <a:gd name="connsiteX116" fmla="*/ 5089362 w 6096000"/>
+              <a:gd name="connsiteY116" fmla="*/ 3586412 h 6858000"/>
+              <a:gd name="connsiteX117" fmla="*/ 5092358 w 6096000"/>
+              <a:gd name="connsiteY117" fmla="*/ 3597336 h 6858000"/>
+              <a:gd name="connsiteX118" fmla="*/ 5084254 w 6096000"/>
+              <a:gd name="connsiteY118" fmla="*/ 3606007 h 6858000"/>
+              <a:gd name="connsiteX119" fmla="*/ 5084281 w 6096000"/>
+              <a:gd name="connsiteY119" fmla="*/ 3641228 h 6858000"/>
+              <a:gd name="connsiteX120" fmla="*/ 5091848 w 6096000"/>
+              <a:gd name="connsiteY120" fmla="*/ 3653088 h 6858000"/>
+              <a:gd name="connsiteX121" fmla="*/ 5097436 w 6096000"/>
+              <a:gd name="connsiteY121" fmla="*/ 3664114 h 6858000"/>
+              <a:gd name="connsiteX122" fmla="*/ 5097518 w 6096000"/>
+              <a:gd name="connsiteY122" fmla="*/ 3665569 h 6858000"/>
+              <a:gd name="connsiteX123" fmla="*/ 5099829 w 6096000"/>
+              <a:gd name="connsiteY123" fmla="*/ 3707357 h 6858000"/>
+              <a:gd name="connsiteX124" fmla="*/ 5114696 w 6096000"/>
+              <a:gd name="connsiteY124" fmla="*/ 3778166 h 6858000"/>
+              <a:gd name="connsiteX125" fmla="*/ 5135379 w 6096000"/>
+              <a:gd name="connsiteY125" fmla="*/ 3878222 h 6858000"/>
+              <a:gd name="connsiteX126" fmla="*/ 5130138 w 6096000"/>
+              <a:gd name="connsiteY126" fmla="*/ 4048117 h 6858000"/>
+              <a:gd name="connsiteX127" fmla="*/ 5090040 w 6096000"/>
+              <a:gd name="connsiteY127" fmla="*/ 4219510 h 6858000"/>
+              <a:gd name="connsiteX128" fmla="*/ 5092812 w 6096000"/>
+              <a:gd name="connsiteY128" fmla="*/ 4411258 h 6858000"/>
+              <a:gd name="connsiteX129" fmla="*/ 5084599 w 6096000"/>
+              <a:gd name="connsiteY129" fmla="*/ 4488531 h 6858000"/>
+              <a:gd name="connsiteX130" fmla="*/ 5084072 w 6096000"/>
+              <a:gd name="connsiteY130" fmla="*/ 4539168 h 6858000"/>
+              <a:gd name="connsiteX131" fmla="*/ 5068936 w 6096000"/>
+              <a:gd name="connsiteY131" fmla="*/ 4625153 h 6858000"/>
+              <a:gd name="connsiteX132" fmla="*/ 5059114 w 6096000"/>
+              <a:gd name="connsiteY132" fmla="*/ 4733115 h 6858000"/>
+              <a:gd name="connsiteX133" fmla="*/ 5037209 w 6096000"/>
+              <a:gd name="connsiteY133" fmla="*/ 4844323 h 6858000"/>
+              <a:gd name="connsiteX134" fmla="*/ 5020638 w 6096000"/>
+              <a:gd name="connsiteY134" fmla="*/ 4877992 h 6858000"/>
+              <a:gd name="connsiteX135" fmla="*/ 5006413 w 6096000"/>
+              <a:gd name="connsiteY135" fmla="*/ 4925805 h 6858000"/>
+              <a:gd name="connsiteX136" fmla="*/ 4971037 w 6096000"/>
+              <a:gd name="connsiteY136" fmla="*/ 5009272 h 6858000"/>
+              <a:gd name="connsiteX137" fmla="*/ 4963105 w 6096000"/>
+              <a:gd name="connsiteY137" fmla="*/ 5111369 h 6858000"/>
+              <a:gd name="connsiteX138" fmla="*/ 4976341 w 6096000"/>
+              <a:gd name="connsiteY138" fmla="*/ 5210876 h 6858000"/>
+              <a:gd name="connsiteX139" fmla="*/ 4980617 w 6096000"/>
+              <a:gd name="connsiteY139" fmla="*/ 5269726 h 6858000"/>
+              <a:gd name="connsiteX140" fmla="*/ 4997733 w 6096000"/>
+              <a:gd name="connsiteY140" fmla="*/ 5464225 h 6858000"/>
+              <a:gd name="connsiteX141" fmla="*/ 5001400 w 6096000"/>
+              <a:gd name="connsiteY141" fmla="*/ 5594585 h 6858000"/>
+              <a:gd name="connsiteX142" fmla="*/ 4983700 w 6096000"/>
+              <a:gd name="connsiteY142" fmla="*/ 5667896 h 6858000"/>
+              <a:gd name="connsiteX143" fmla="*/ 4968506 w 6096000"/>
+              <a:gd name="connsiteY143" fmla="*/ 5769225 h 6858000"/>
+              <a:gd name="connsiteX144" fmla="*/ 4969765 w 6096000"/>
+              <a:gd name="connsiteY144" fmla="*/ 5823324 h 6858000"/>
+              <a:gd name="connsiteX145" fmla="*/ 4966129 w 6096000"/>
+              <a:gd name="connsiteY145" fmla="*/ 5862699 h 6858000"/>
+              <a:gd name="connsiteX146" fmla="*/ 4970695 w 6096000"/>
+              <a:gd name="connsiteY146" fmla="*/ 5906467 h 6858000"/>
+              <a:gd name="connsiteX147" fmla="*/ 4991568 w 6096000"/>
+              <a:gd name="connsiteY147" fmla="*/ 5939847 h 6858000"/>
+              <a:gd name="connsiteX148" fmla="*/ 4986815 w 6096000"/>
+              <a:gd name="connsiteY148" fmla="*/ 5973994 h 6858000"/>
+              <a:gd name="connsiteX149" fmla="*/ 4987776 w 6096000"/>
+              <a:gd name="connsiteY149" fmla="*/ 6089693 h 6858000"/>
+              <a:gd name="connsiteX150" fmla="*/ 4991621 w 6096000"/>
+              <a:gd name="connsiteY150" fmla="*/ 6224938 h 6858000"/>
+              <a:gd name="connsiteX151" fmla="*/ 5017157 w 6096000"/>
+              <a:gd name="connsiteY151" fmla="*/ 6370251 h 6858000"/>
+              <a:gd name="connsiteX152" fmla="*/ 5040797 w 6096000"/>
+              <a:gd name="connsiteY152" fmla="*/ 6541313 h 6858000"/>
+              <a:gd name="connsiteX153" fmla="*/ 5045375 w 6096000"/>
+              <a:gd name="connsiteY153" fmla="*/ 6640957 h 6858000"/>
+              <a:gd name="connsiteX154" fmla="*/ 5058442 w 6096000"/>
+              <a:gd name="connsiteY154" fmla="*/ 6705297 h 6858000"/>
+              <a:gd name="connsiteX155" fmla="*/ 5071125 w 6096000"/>
+              <a:gd name="connsiteY155" fmla="*/ 6759582 h 6858000"/>
+              <a:gd name="connsiteX156" fmla="*/ 5069172 w 6096000"/>
+              <a:gd name="connsiteY156" fmla="*/ 6817746 h 6858000"/>
+              <a:gd name="connsiteX157" fmla="*/ 5072322 w 6096000"/>
+              <a:gd name="connsiteY157" fmla="*/ 6843646 h 6858000"/>
+              <a:gd name="connsiteX158" fmla="*/ 5091388 w 6096000"/>
+              <a:gd name="connsiteY158" fmla="*/ 6857998 h 6858000"/>
+              <a:gd name="connsiteX159" fmla="*/ 6096000 w 6096000"/>
+              <a:gd name="connsiteY159" fmla="*/ 6857998 h 6858000"/>
+              <a:gd name="connsiteX160" fmla="*/ 6096000 w 6096000"/>
+              <a:gd name="connsiteY160" fmla="*/ 6858000 h 6858000"/>
+              <a:gd name="connsiteX161" fmla="*/ 0 w 6096000"/>
+              <a:gd name="connsiteY161" fmla="*/ 6858000 h 6858000"/>
+            </a:gdLst>
+            <a:ahLst/>
+            <a:cxnLst>
+              <a:cxn ang="0">
+                <a:pos x="connsiteX0" y="connsiteY0"/>
+              </a:cxn>
+              <a:cxn ang="0">
+                <a:pos x="connsiteX1" y="connsiteY1"/>
+              </a:cxn>
+              <a:cxn ang="0">
+                <a:pos x="connsiteX2" y="connsiteY2"/>
+              </a:cxn>
+              <a:cxn ang="0">
+                <a:pos x="connsiteX3" y="connsiteY3"/>
+              </a:cxn>
+              <a:cxn ang="0">
+                <a:pos x="connsiteX4" y="connsiteY4"/>
+              </a:cxn>
+              <a:cxn ang="0">
+                <a:pos x="connsiteX5" y="connsiteY5"/>
+              </a:cxn>
+              <a:cxn ang="0">
+                <a:pos x="connsiteX6" y="connsiteY6"/>
+              </a:cxn>
+              <a:cxn ang="0">
+                <a:pos x="connsiteX7" y="connsiteY7"/>
+              </a:cxn>
+              <a:cxn ang="0">
+                <a:pos x="connsiteX8" y="connsiteY8"/>
+              </a:cxn>
+              <a:cxn ang="0">
+                <a:pos x="connsiteX9" y="connsiteY9"/>
+              </a:cxn>
+              <a:cxn ang="0">
+                <a:pos x="connsiteX10" y="connsiteY10"/>
+              </a:cxn>
+              <a:cxn ang="0">
+                <a:pos x="connsiteX11" y="connsiteY11"/>
+              </a:cxn>
+              <a:cxn ang="0">
+                <a:pos x="connsiteX12" y="connsiteY12"/>
+              </a:cxn>
+              <a:cxn ang="0">
+                <a:pos x="connsiteX13" y="connsiteY13"/>
+              </a:cxn>
+              <a:cxn ang="0">
+                <a:pos x="connsiteX14" y="connsiteY14"/>
+              </a:cxn>
+              <a:cxn ang="0">
+                <a:pos x="connsiteX15" y="connsiteY15"/>
+              </a:cxn>
+              <a:cxn ang="0">
+                <a:pos x="connsiteX16" y="connsiteY16"/>
+              </a:cxn>
+              <a:cxn ang="0">
+                <a:pos x="connsiteX17" y="connsiteY17"/>
+              </a:cxn>
+              <a:cxn ang="0">
+                <a:pos x="connsiteX18" y="connsiteY18"/>
+              </a:cxn>
+              <a:cxn ang="0">
+                <a:pos x="connsiteX19" y="connsiteY19"/>
+              </a:cxn>
+              <a:cxn ang="0">
+                <a:pos x="connsiteX20" y="connsiteY20"/>
+              </a:cxn>
+              <a:cxn ang="0">
+                <a:pos x="connsiteX21" y="connsiteY21"/>
+              </a:cxn>
+              <a:cxn ang="0">
+                <a:pos x="connsiteX22" y="connsiteY22"/>
+              </a:cxn>
+              <a:cxn ang="0">
+                <a:pos x="connsiteX23" y="connsiteY23"/>
+              </a:cxn>
+              <a:cxn ang="0">
+                <a:pos x="connsiteX24" y="connsiteY24"/>
+              </a:cxn>
+              <a:cxn ang="0">
+                <a:pos x="connsiteX25" y="connsiteY25"/>
+              </a:cxn>
+              <a:cxn ang="0">
+                <a:pos x="connsiteX26" y="connsiteY26"/>
+              </a:cxn>
+              <a:cxn ang="0">
+                <a:pos x="connsiteX27" y="connsiteY27"/>
+              </a:cxn>
+              <a:cxn ang="0">
+                <a:pos x="connsiteX28" y="connsiteY28"/>
+              </a:cxn>
+              <a:cxn ang="0">
+                <a:pos x="connsiteX29" y="connsiteY29"/>
+              </a:cxn>
+              <a:cxn ang="0">
+                <a:pos x="connsiteX30" y="connsiteY30"/>
+              </a:cxn>
+              <a:cxn ang="0">
+                <a:pos x="connsiteX31" y="connsiteY31"/>
+              </a:cxn>
+              <a:cxn ang="0">
+                <a:pos x="connsiteX32" y="connsiteY32"/>
+              </a:cxn>
+              <a:cxn ang="0">
+                <a:pos x="connsiteX33" y="connsiteY33"/>
+              </a:cxn>
+              <a:cxn ang="0">
+                <a:pos x="connsiteX34" y="connsiteY34"/>
+              </a:cxn>
+              <a:cxn ang="0">
+                <a:pos x="connsiteX35" y="connsiteY35"/>
+              </a:cxn>
+              <a:cxn ang="0">
+                <a:pos x="connsiteX36" y="connsiteY36"/>
+              </a:cxn>
+              <a:cxn ang="0">
+                <a:pos x="connsiteX37" y="connsiteY37"/>
+              </a:cxn>
+              <a:cxn ang="0">
+                <a:pos x="connsiteX38" y="connsiteY38"/>
+              </a:cxn>
+              <a:cxn ang="0">
+                <a:pos x="connsiteX39" y="connsiteY39"/>
+              </a:cxn>
+              <a:cxn ang="0">
+                <a:pos x="connsiteX40" y="connsiteY40"/>
+              </a:cxn>
+              <a:cxn ang="0">
+                <a:pos x="connsiteX41" y="connsiteY41"/>
+              </a:cxn>
+              <a:cxn ang="0">
+                <a:pos x="connsiteX42" y="connsiteY42"/>
+              </a:cxn>
+              <a:cxn ang="0">
+                <a:pos x="connsiteX43" y="connsiteY43"/>
+              </a:cxn>
+              <a:cxn ang="0">
+                <a:pos x="connsiteX44" y="connsiteY44"/>
+              </a:cxn>
+              <a:cxn ang="0">
+                <a:pos x="connsiteX45" y="connsiteY45"/>
+              </a:cxn>
+              <a:cxn ang="0">
+                <a:pos x="connsiteX46" y="connsiteY46"/>
+              </a:cxn>
+              <a:cxn ang="0">
+                <a:pos x="connsiteX47" y="connsiteY47"/>
+              </a:cxn>
+              <a:cxn ang="0">
+                <a:pos x="connsiteX48" y="connsiteY48"/>
+              </a:cxn>
+              <a:cxn ang="0">
+                <a:pos x="connsiteX49" y="connsiteY49"/>
+              </a:cxn>
+              <a:cxn ang="0">
+                <a:pos x="connsiteX50" y="connsiteY50"/>
+              </a:cxn>
+              <a:cxn ang="0">
+                <a:pos x="connsiteX51" y="connsiteY51"/>
+              </a:cxn>
+              <a:cxn ang="0">
+                <a:pos x="connsiteX52" y="connsiteY52"/>
+              </a:cxn>
+              <a:cxn ang="0">
+                <a:pos x="connsiteX53" y="connsiteY53"/>
+              </a:cxn>
+              <a:cxn ang="0">
+                <a:pos x="connsiteX54" y="connsiteY54"/>
+              </a:cxn>
+              <a:cxn ang="0">
+                <a:pos x="connsiteX55" y="connsiteY55"/>
+              </a:cxn>
+              <a:cxn ang="0">
+                <a:pos x="connsiteX56" y="connsiteY56"/>
+              </a:cxn>
+              <a:cxn ang="0">
+                <a:pos x="connsiteX57" y="connsiteY57"/>
+              </a:cxn>
+              <a:cxn ang="0">
+                <a:pos x="connsiteX58" y="connsiteY58"/>
+              </a:cxn>
+              <a:cxn ang="0">
+                <a:pos x="connsiteX59" y="connsiteY59"/>
+              </a:cxn>
+              <a:cxn ang="0">
+                <a:pos x="connsiteX60" y="connsiteY60"/>
+              </a:cxn>
+              <a:cxn ang="0">
+                <a:pos x="connsiteX61" y="connsiteY61"/>
+              </a:cxn>
+              <a:cxn ang="0">
+                <a:pos x="connsiteX62" y="connsiteY62"/>
+              </a:cxn>
+              <a:cxn ang="0">
+                <a:pos x="connsiteX63" y="connsiteY63"/>
+              </a:cxn>
+              <a:cxn ang="0">
+                <a:pos x="connsiteX64" y="connsiteY64"/>
+              </a:cxn>
+              <a:cxn ang="0">
+                <a:pos x="connsiteX65" y="connsiteY65"/>
+              </a:cxn>
+              <a:cxn ang="0">
+                <a:pos x="connsiteX66" y="connsiteY66"/>
+              </a:cxn>
+              <a:cxn ang="0">
+                <a:pos x="connsiteX67" y="connsiteY67"/>
+              </a:cxn>
+              <a:cxn ang="0">
+                <a:pos x="connsiteX68" y="connsiteY68"/>
+              </a:cxn>
+              <a:cxn ang="0">
+                <a:pos x="connsiteX69" y="connsiteY69"/>
+              </a:cxn>
+              <a:cxn ang="0">
+                <a:pos x="connsiteX70" y="connsiteY70"/>
+              </a:cxn>
+              <a:cxn ang="0">
+                <a:pos x="connsiteX71" y="connsiteY71"/>
+              </a:cxn>
+              <a:cxn ang="0">
+                <a:pos x="connsiteX72" y="connsiteY72"/>
+              </a:cxn>
+              <a:cxn ang="0">
+                <a:pos x="connsiteX73" y="connsiteY73"/>
+              </a:cxn>
+              <a:cxn ang="0">
+                <a:pos x="connsiteX74" y="connsiteY74"/>
+              </a:cxn>
+              <a:cxn ang="0">
+                <a:pos x="connsiteX75" y="connsiteY75"/>
+              </a:cxn>
+              <a:cxn ang="0">
+                <a:pos x="connsiteX76" y="connsiteY76"/>
+              </a:cxn>
+              <a:cxn ang="0">
+                <a:pos x="connsiteX77" y="connsiteY77"/>
+              </a:cxn>
+              <a:cxn ang="0">
+                <a:pos x="connsiteX78" y="connsiteY78"/>
+              </a:cxn>
+              <a:cxn ang="0">
+                <a:pos x="connsiteX79" y="connsiteY79"/>
+              </a:cxn>
+              <a:cxn ang="0">
+                <a:pos x="connsiteX80" y="connsiteY80"/>
+              </a:cxn>
+              <a:cxn ang="0">
+                <a:pos x="connsiteX81" y="connsiteY81"/>
+              </a:cxn>
+              <a:cxn ang="0">
+                <a:pos x="connsiteX82" y="connsiteY82"/>
+              </a:cxn>
+              <a:cxn ang="0">
+                <a:pos x="connsiteX83" y="connsiteY83"/>
+              </a:cxn>
+              <a:cxn ang="0">
+                <a:pos x="connsiteX84" y="connsiteY84"/>
+              </a:cxn>
+              <a:cxn ang="0">
+                <a:pos x="connsiteX85" y="connsiteY85"/>
+              </a:cxn>
+              <a:cxn ang="0">
+                <a:pos x="connsiteX86" y="connsiteY86"/>
+              </a:cxn>
+              <a:cxn ang="0">
+                <a:pos x="connsiteX87" y="connsiteY87"/>
+              </a:cxn>
+              <a:cxn ang="0">
+                <a:pos x="connsiteX88" y="connsiteY88"/>
+              </a:cxn>
+              <a:cxn ang="0">
+                <a:pos x="connsiteX89" y="connsiteY89"/>
+              </a:cxn>
+              <a:cxn ang="0">
+                <a:pos x="connsiteX90" y="connsiteY90"/>
+              </a:cxn>
+              <a:cxn ang="0">
+                <a:pos x="connsiteX91" y="connsiteY91"/>
+              </a:cxn>
+              <a:cxn ang="0">
+                <a:pos x="connsiteX92" y="connsiteY92"/>
+              </a:cxn>
+              <a:cxn ang="0">
+                <a:pos x="connsiteX93" y="connsiteY93"/>
+              </a:cxn>
+              <a:cxn ang="0">
+                <a:pos x="connsiteX94" y="connsiteY94"/>
+              </a:cxn>
+              <a:cxn ang="0">
+                <a:pos x="connsiteX95" y="connsiteY95"/>
+              </a:cxn>
+              <a:cxn ang="0">
+                <a:pos x="connsiteX96" y="connsiteY96"/>
+              </a:cxn>
+              <a:cxn ang="0">
+                <a:pos x="connsiteX97" y="connsiteY97"/>
+              </a:cxn>
+              <a:cxn ang="0">
+                <a:pos x="connsiteX98" y="connsiteY98"/>
+              </a:cxn>
+              <a:cxn ang="0">
+                <a:pos x="connsiteX99" y="connsiteY99"/>
+              </a:cxn>
+              <a:cxn ang="0">
+                <a:pos x="connsiteX100" y="connsiteY100"/>
+              </a:cxn>
+              <a:cxn ang="0">
+                <a:pos x="connsiteX101" y="connsiteY101"/>
+              </a:cxn>
+              <a:cxn ang="0">
+                <a:pos x="connsiteX102" y="connsiteY102"/>
+              </a:cxn>
+              <a:cxn ang="0">
+                <a:pos x="connsiteX103" y="connsiteY103"/>
+              </a:cxn>
+              <a:cxn ang="0">
+                <a:pos x="connsiteX104" y="connsiteY104"/>
+              </a:cxn>
+              <a:cxn ang="0">
+                <a:pos x="connsiteX105" y="connsiteY105"/>
+              </a:cxn>
+              <a:cxn ang="0">
+                <a:pos x="connsiteX106" y="connsiteY106"/>
+              </a:cxn>
+              <a:cxn ang="0">
+                <a:pos x="connsiteX107" y="connsiteY107"/>
+              </a:cxn>
+              <a:cxn ang="0">
+                <a:pos x="connsiteX108" y="connsiteY108"/>
+              </a:cxn>
+              <a:cxn ang="0">
+                <a:pos x="connsiteX109" y="connsiteY109"/>
+              </a:cxn>
+              <a:cxn ang="0">
+                <a:pos x="connsiteX110" y="connsiteY110"/>
+              </a:cxn>
+              <a:cxn ang="0">
+                <a:pos x="connsiteX111" y="connsiteY111"/>
+              </a:cxn>
+              <a:cxn ang="0">
+                <a:pos x="connsiteX112" y="connsiteY112"/>
+              </a:cxn>
+              <a:cxn ang="0">
+                <a:pos x="connsiteX113" y="connsiteY113"/>
+              </a:cxn>
+              <a:cxn ang="0">
+                <a:pos x="connsiteX114" y="connsiteY114"/>
+              </a:cxn>
+              <a:cxn ang="0">
+                <a:pos x="connsiteX115" y="connsiteY115"/>
+              </a:cxn>
+              <a:cxn ang="0">
+                <a:pos x="connsiteX116" y="connsiteY116"/>
+              </a:cxn>
+              <a:cxn ang="0">
+                <a:pos x="connsiteX117" y="connsiteY117"/>
+              </a:cxn>
+              <a:cxn ang="0">
+                <a:pos x="connsiteX118" y="connsiteY118"/>
+              </a:cxn>
+              <a:cxn ang="0">
+                <a:pos x="connsiteX119" y="connsiteY119"/>
+              </a:cxn>
+              <a:cxn ang="0">
+                <a:pos x="connsiteX120" y="connsiteY120"/>
+              </a:cxn>
+              <a:cxn ang="0">
+                <a:pos x="connsiteX121" y="connsiteY121"/>
+              </a:cxn>
+              <a:cxn ang="0">
+                <a:pos x="connsiteX122" y="connsiteY122"/>
+              </a:cxn>
+              <a:cxn ang="0">
+                <a:pos x="connsiteX123" y="connsiteY123"/>
+              </a:cxn>
+              <a:cxn ang="0">
+                <a:pos x="connsiteX124" y="connsiteY124"/>
+              </a:cxn>
+              <a:cxn ang="0">
+                <a:pos x="connsiteX125" y="connsiteY125"/>
+              </a:cxn>
+              <a:cxn ang="0">
+                <a:pos x="connsiteX126" y="connsiteY126"/>
+              </a:cxn>
+              <a:cxn ang="0">
+                <a:pos x="connsiteX127" y="connsiteY127"/>
+              </a:cxn>
+              <a:cxn ang="0">
+                <a:pos x="connsiteX128" y="connsiteY128"/>
+              </a:cxn>
+              <a:cxn ang="0">
+                <a:pos x="connsiteX129" y="connsiteY129"/>
+              </a:cxn>
+              <a:cxn ang="0">
+                <a:pos x="connsiteX130" y="connsiteY130"/>
+              </a:cxn>
+              <a:cxn ang="0">
+                <a:pos x="connsiteX131" y="connsiteY131"/>
+              </a:cxn>
+              <a:cxn ang="0">
+                <a:pos x="connsiteX132" y="connsiteY132"/>
+              </a:cxn>
+              <a:cxn ang="0">
+                <a:pos x="connsiteX133" y="connsiteY133"/>
+              </a:cxn>
+              <a:cxn ang="0">
+                <a:pos x="connsiteX134" y="connsiteY134"/>
+              </a:cxn>
+              <a:cxn ang="0">
+                <a:pos x="connsiteX135" y="connsiteY135"/>
+              </a:cxn>
+              <a:cxn ang="0">
+                <a:pos x="connsiteX136" y="connsiteY136"/>
+              </a:cxn>
+              <a:cxn ang="0">
+                <a:pos x="connsiteX137" y="connsiteY137"/>
+              </a:cxn>
+              <a:cxn ang="0">
+                <a:pos x="connsiteX138" y="connsiteY138"/>
+              </a:cxn>
+              <a:cxn ang="0">
+                <a:pos x="connsiteX139" y="connsiteY139"/>
+              </a:cxn>
+              <a:cxn ang="0">
+                <a:pos x="connsiteX140" y="connsiteY140"/>
+              </a:cxn>
+              <a:cxn ang="0">
+                <a:pos x="connsiteX141" y="connsiteY141"/>
+              </a:cxn>
+              <a:cxn ang="0">
+                <a:pos x="connsiteX142" y="connsiteY142"/>
+              </a:cxn>
+              <a:cxn ang="0">
+                <a:pos x="connsiteX143" y="connsiteY143"/>
+              </a:cxn>
+              <a:cxn ang="0">
+                <a:pos x="connsiteX144" y="connsiteY144"/>
+              </a:cxn>
+              <a:cxn ang="0">
+                <a:pos x="connsiteX145" y="connsiteY145"/>
+              </a:cxn>
+              <a:cxn ang="0">
+                <a:pos x="connsiteX146" y="connsiteY146"/>
+              </a:cxn>
+              <a:cxn ang="0">
+                <a:pos x="connsiteX147" y="connsiteY147"/>
+              </a:cxn>
+              <a:cxn ang="0">
+                <a:pos x="connsiteX148" y="connsiteY148"/>
+              </a:cxn>
+              <a:cxn ang="0">
+                <a:pos x="connsiteX149" y="connsiteY149"/>
+              </a:cxn>
+              <a:cxn ang="0">
+                <a:pos x="connsiteX150" y="connsiteY150"/>
+              </a:cxn>
+              <a:cxn ang="0">
+                <a:pos x="connsiteX151" y="connsiteY151"/>
+              </a:cxn>
+              <a:cxn ang="0">
+                <a:pos x="connsiteX152" y="connsiteY152"/>
+              </a:cxn>
+              <a:cxn ang="0">
+                <a:pos x="connsiteX153" y="connsiteY153"/>
+              </a:cxn>
+              <a:cxn ang="0">
+                <a:pos x="connsiteX154" y="connsiteY154"/>
+              </a:cxn>
+              <a:cxn ang="0">
+                <a:pos x="connsiteX155" y="connsiteY155"/>
+              </a:cxn>
+              <a:cxn ang="0">
+                <a:pos x="connsiteX156" y="connsiteY156"/>
+              </a:cxn>
+              <a:cxn ang="0">
+                <a:pos x="connsiteX157" y="connsiteY157"/>
+              </a:cxn>
+              <a:cxn ang="0">
+                <a:pos x="connsiteX158" y="connsiteY158"/>
+              </a:cxn>
+              <a:cxn ang="0">
+                <a:pos x="connsiteX159" y="connsiteY159"/>
+              </a:cxn>
+              <a:cxn ang="0">
+                <a:pos x="connsiteX160" y="connsiteY160"/>
+              </a:cxn>
+              <a:cxn ang="0">
+                <a:pos x="connsiteX161" y="connsiteY161"/>
+              </a:cxn>
+            </a:cxnLst>
+            <a:rect l="l" t="t" r="r" b="b"/>
+            <a:pathLst>
+              <a:path w="6096000" h="6858000">
+                <a:moveTo>
+                  <a:pt x="0" y="0"/>
+                </a:moveTo>
+                <a:lnTo>
+                  <a:pt x="5567517" y="0"/>
+                </a:lnTo>
+                <a:lnTo>
+                  <a:pt x="5566938" y="1705"/>
+                </a:lnTo>
+                <a:cubicBezTo>
+                  <a:pt x="5563126" y="8440"/>
+                  <a:pt x="5558112" y="13784"/>
+                  <a:pt x="5551594" y="17287"/>
+                </a:cubicBezTo>
+                <a:cubicBezTo>
+                  <a:pt x="5562364" y="82036"/>
+                  <a:pt x="5510349" y="69804"/>
+                  <a:pt x="5545641" y="130336"/>
+                </a:cubicBezTo>
+                <a:cubicBezTo>
+                  <a:pt x="5526953" y="117589"/>
+                  <a:pt x="5536978" y="162458"/>
+                  <a:pt x="5538289" y="187093"/>
+                </a:cubicBezTo>
+                <a:cubicBezTo>
+                  <a:pt x="5536205" y="226511"/>
+                  <a:pt x="5545722" y="205530"/>
+                  <a:pt x="5545790" y="265704"/>
+                </a:cubicBezTo>
+                <a:cubicBezTo>
+                  <a:pt x="5542296" y="317533"/>
+                  <a:pt x="5543813" y="325288"/>
+                  <a:pt x="5542313" y="354566"/>
+                </a:cubicBezTo>
+                <a:lnTo>
+                  <a:pt x="5524126" y="472000"/>
+                </a:lnTo>
+                <a:lnTo>
+                  <a:pt x="5522170" y="473782"/>
+                </a:lnTo>
+                <a:cubicBezTo>
+                  <a:pt x="5517847" y="482008"/>
+                  <a:pt x="5518682" y="487340"/>
+                  <a:pt x="5521798" y="491380"/>
+                </a:cubicBezTo>
+                <a:lnTo>
+                  <a:pt x="5536419" y="531675"/>
+                </a:lnTo>
+                <a:lnTo>
+                  <a:pt x="5533435" y="536015"/>
+                </a:lnTo>
+                <a:lnTo>
+                  <a:pt x="5538088" y="572092"/>
+                </a:lnTo>
+                <a:lnTo>
+                  <a:pt x="5536061" y="572511"/>
+                </a:lnTo>
+                <a:cubicBezTo>
+                  <a:pt x="5531611" y="574271"/>
+                  <a:pt x="5528529" y="577121"/>
+                  <a:pt x="5528218" y="582332"/>
+                </a:cubicBezTo>
+                <a:cubicBezTo>
+                  <a:pt x="5498002" y="573171"/>
+                  <a:pt x="5516262" y="585107"/>
+                  <a:pt x="5518011" y="601285"/>
+                </a:cubicBezTo>
+                <a:cubicBezTo>
+                  <a:pt x="5508838" y="617831"/>
+                  <a:pt x="5480684" y="666964"/>
+                  <a:pt x="5473174" y="681608"/>
+                </a:cubicBezTo>
+                <a:cubicBezTo>
+                  <a:pt x="5473102" y="684122"/>
+                  <a:pt x="5473033" y="686637"/>
+                  <a:pt x="5472963" y="689151"/>
+                </a:cubicBezTo>
+                <a:lnTo>
+                  <a:pt x="5472485" y="689289"/>
+                </a:lnTo>
+                <a:cubicBezTo>
+                  <a:pt x="5471434" y="690905"/>
+                  <a:pt x="5470986" y="693376"/>
+                  <a:pt x="5471326" y="697222"/>
+                </a:cubicBezTo>
+                <a:cubicBezTo>
+                  <a:pt x="5471606" y="703992"/>
+                  <a:pt x="5471884" y="710761"/>
+                  <a:pt x="5472164" y="717531"/>
+                </a:cubicBezTo>
+                <a:lnTo>
+                  <a:pt x="5468891" y="722494"/>
+                </a:lnTo>
+                <a:lnTo>
+                  <a:pt x="5463081" y="724368"/>
+                </a:lnTo>
+                <a:lnTo>
+                  <a:pt x="5446981" y="752692"/>
+                </a:lnTo>
+                <a:cubicBezTo>
+                  <a:pt x="5454691" y="764380"/>
+                  <a:pt x="5422719" y="808083"/>
+                  <a:pt x="5417190" y="816346"/>
+                </a:cubicBezTo>
+                <a:lnTo>
+                  <a:pt x="5388958" y="889417"/>
+                </a:lnTo>
+                <a:cubicBezTo>
+                  <a:pt x="5320491" y="969963"/>
+                  <a:pt x="5321907" y="1005331"/>
+                  <a:pt x="5307044" y="1063288"/>
+                </a:cubicBezTo>
+                <a:cubicBezTo>
+                  <a:pt x="5313332" y="1111028"/>
+                  <a:pt x="5317096" y="1110140"/>
+                  <a:pt x="5303837" y="1157176"/>
+                </a:cubicBezTo>
+                <a:cubicBezTo>
+                  <a:pt x="5301103" y="1192124"/>
+                  <a:pt x="5301884" y="1197232"/>
+                  <a:pt x="5286494" y="1210776"/>
+                </a:cubicBezTo>
+                <a:lnTo>
+                  <a:pt x="5282463" y="1301993"/>
+                </a:lnTo>
+                <a:lnTo>
+                  <a:pt x="5252235" y="1360879"/>
+                </a:lnTo>
+                <a:lnTo>
+                  <a:pt x="5244497" y="1404045"/>
+                </a:lnTo>
+                <a:lnTo>
+                  <a:pt x="5223823" y="1429568"/>
+                </a:lnTo>
+                <a:lnTo>
+                  <a:pt x="5224851" y="1430305"/>
+                </a:lnTo>
+                <a:cubicBezTo>
+                  <a:pt x="5226697" y="1432466"/>
+                  <a:pt x="5214738" y="1459891"/>
+                  <a:pt x="5212394" y="1463304"/>
+                </a:cubicBezTo>
+                <a:cubicBezTo>
+                  <a:pt x="5209912" y="1477394"/>
+                  <a:pt x="5213027" y="1501295"/>
+                  <a:pt x="5209958" y="1514846"/>
+                </a:cubicBezTo>
+                <a:lnTo>
+                  <a:pt x="5206417" y="1519731"/>
+                </a:lnTo>
+                <a:lnTo>
+                  <a:pt x="5206640" y="1519929"/>
+                </a:lnTo>
+                <a:cubicBezTo>
+                  <a:pt x="5206490" y="1521210"/>
+                  <a:pt x="5209710" y="1543635"/>
+                  <a:pt x="5207632" y="1546022"/>
+                </a:cubicBezTo>
+                <a:lnTo>
+                  <a:pt x="5212030" y="1578752"/>
+                </a:lnTo>
+                <a:cubicBezTo>
+                  <a:pt x="5206147" y="1605585"/>
+                  <a:pt x="5226381" y="1622803"/>
+                  <a:pt x="5203533" y="1647555"/>
+                </a:cubicBezTo>
+                <a:cubicBezTo>
+                  <a:pt x="5198128" y="1672675"/>
+                  <a:pt x="5203213" y="1694404"/>
+                  <a:pt x="5190877" y="1715685"/>
+                </a:cubicBezTo>
+                <a:cubicBezTo>
+                  <a:pt x="5196815" y="1724301"/>
+                  <a:pt x="5198098" y="1732435"/>
+                  <a:pt x="5184235" y="1740358"/>
+                </a:cubicBezTo>
+                <a:cubicBezTo>
+                  <a:pt x="5182625" y="1763793"/>
+                  <a:pt x="5198368" y="1769422"/>
+                  <a:pt x="5181475" y="1784314"/>
+                </a:cubicBezTo>
+                <a:cubicBezTo>
+                  <a:pt x="5205987" y="1797417"/>
+                  <a:pt x="5195246" y="1798221"/>
+                  <a:pt x="5185845" y="1804434"/>
+                </a:cubicBezTo>
+                <a:lnTo>
+                  <a:pt x="5185068" y="1805316"/>
+                </a:lnTo>
+                <a:lnTo>
+                  <a:pt x="5188593" y="1807109"/>
+                </a:lnTo>
+                <a:lnTo>
+                  <a:pt x="5185920" y="1821003"/>
+                </a:lnTo>
+                <a:lnTo>
+                  <a:pt x="5183543" y="1824832"/>
+                </a:lnTo>
+                <a:cubicBezTo>
+                  <a:pt x="5182284" y="1827468"/>
+                  <a:pt x="5181937" y="1829219"/>
+                  <a:pt x="5182235" y="1830429"/>
+                </a:cubicBezTo>
+                <a:lnTo>
+                  <a:pt x="5182525" y="1830569"/>
+                </a:lnTo>
+                <a:lnTo>
+                  <a:pt x="5180663" y="1835810"/>
+                </a:lnTo>
+                <a:cubicBezTo>
+                  <a:pt x="5176779" y="1844665"/>
+                  <a:pt x="5172297" y="1853278"/>
+                  <a:pt x="5167452" y="1861483"/>
+                </a:cubicBezTo>
+                <a:cubicBezTo>
+                  <a:pt x="5179827" y="1866643"/>
+                  <a:pt x="5166788" y="1884999"/>
+                  <a:pt x="5174266" y="1892417"/>
+                </a:cubicBezTo>
+                <a:lnTo>
+                  <a:pt x="5189262" y="1895114"/>
+                </a:lnTo>
+                <a:lnTo>
+                  <a:pt x="5187100" y="1899379"/>
+                </a:lnTo>
+                <a:lnTo>
+                  <a:pt x="5180471" y="1907867"/>
+                </a:lnTo>
+                <a:cubicBezTo>
+                  <a:pt x="5179609" y="1909162"/>
+                  <a:pt x="5179647" y="1909994"/>
+                  <a:pt x="5181361" y="1910265"/>
+                </a:cubicBezTo>
+                <a:cubicBezTo>
+                  <a:pt x="5180995" y="1914884"/>
+                  <a:pt x="5177893" y="1930292"/>
+                  <a:pt x="5178268" y="1935584"/>
+                </a:cubicBezTo>
+                <a:lnTo>
+                  <a:pt x="5183619" y="1942021"/>
+                </a:lnTo>
+                <a:lnTo>
+                  <a:pt x="5184480" y="1945112"/>
+                </a:lnTo>
+                <a:lnTo>
+                  <a:pt x="5172776" y="1961162"/>
+                </a:lnTo>
+                <a:lnTo>
+                  <a:pt x="5168513" y="1969445"/>
+                </a:lnTo>
+                <a:lnTo>
+                  <a:pt x="5126597" y="2024270"/>
+                </a:lnTo>
+                <a:lnTo>
+                  <a:pt x="5119528" y="2107942"/>
+                </a:lnTo>
+                <a:cubicBezTo>
+                  <a:pt x="5089290" y="2138038"/>
+                  <a:pt x="5110415" y="2159228"/>
+                  <a:pt x="5110356" y="2193455"/>
+                </a:cubicBezTo>
+                <a:cubicBezTo>
+                  <a:pt x="5101302" y="2220953"/>
+                  <a:pt x="5110381" y="2224200"/>
+                  <a:pt x="5104992" y="2260088"/>
+                </a:cubicBezTo>
+                <a:cubicBezTo>
+                  <a:pt x="5096504" y="2291744"/>
+                  <a:pt x="5078225" y="2299003"/>
+                  <a:pt x="5059439" y="2335735"/>
+                </a:cubicBezTo>
+                <a:cubicBezTo>
+                  <a:pt x="5029465" y="2329020"/>
+                  <a:pt x="5058046" y="2407546"/>
+                  <a:pt x="5022061" y="2408995"/>
+                </a:cubicBezTo>
+                <a:cubicBezTo>
+                  <a:pt x="5023289" y="2413465"/>
+                  <a:pt x="5019654" y="2441580"/>
+                  <a:pt x="5022253" y="2445869"/>
+                </a:cubicBezTo>
+                <a:cubicBezTo>
+                  <a:pt x="5022440" y="2449625"/>
+                  <a:pt x="5011241" y="2492743"/>
+                  <a:pt x="5011426" y="2496499"/>
+                </a:cubicBezTo>
+                <a:lnTo>
+                  <a:pt x="4994224" y="2549900"/>
+                </a:lnTo>
+                <a:cubicBezTo>
+                  <a:pt x="4992353" y="2564757"/>
+                  <a:pt x="4998952" y="2582253"/>
+                  <a:pt x="4995245" y="2596456"/>
+                </a:cubicBezTo>
+                <a:lnTo>
+                  <a:pt x="4988570" y="2606088"/>
+                </a:lnTo>
+                <a:cubicBezTo>
+                  <a:pt x="4988504" y="2615842"/>
+                  <a:pt x="4988436" y="2625597"/>
+                  <a:pt x="4988371" y="2635351"/>
+                </a:cubicBezTo>
+                <a:lnTo>
+                  <a:pt x="4983212" y="2665666"/>
+                </a:lnTo>
+                <a:lnTo>
+                  <a:pt x="4968234" y="2715895"/>
+                </a:lnTo>
+                <a:lnTo>
+                  <a:pt x="4975888" y="2725052"/>
+                </a:lnTo>
+                <a:lnTo>
+                  <a:pt x="4980195" y="2726489"/>
+                </a:lnTo>
+                <a:lnTo>
+                  <a:pt x="4976218" y="2740278"/>
+                </a:lnTo>
+                <a:lnTo>
+                  <a:pt x="4980571" y="2751112"/>
+                </a:lnTo>
+                <a:lnTo>
+                  <a:pt x="4973893" y="2760208"/>
+                </a:lnTo>
+                <a:lnTo>
+                  <a:pt x="4979005" y="2790136"/>
+                </a:lnTo>
+                <a:lnTo>
+                  <a:pt x="4986137" y="2804183"/>
+                </a:lnTo>
+                <a:cubicBezTo>
+                  <a:pt x="4986150" y="2811409"/>
+                  <a:pt x="4986162" y="2818634"/>
+                  <a:pt x="4986175" y="2825860"/>
+                </a:cubicBezTo>
+                <a:cubicBezTo>
+                  <a:pt x="4987474" y="2843788"/>
+                  <a:pt x="4992871" y="2886513"/>
+                  <a:pt x="4993936" y="2911749"/>
+                </a:cubicBezTo>
+                <a:cubicBezTo>
+                  <a:pt x="4993313" y="2946689"/>
+                  <a:pt x="4980300" y="2954448"/>
+                  <a:pt x="4992563" y="2977278"/>
+                </a:cubicBezTo>
+                <a:cubicBezTo>
+                  <a:pt x="4985688" y="2983455"/>
+                  <a:pt x="4982051" y="2987749"/>
+                  <a:pt x="4980516" y="2991092"/>
+                </a:cubicBezTo>
+                <a:cubicBezTo>
+                  <a:pt x="4975910" y="3001119"/>
+                  <a:pt x="4990216" y="3002537"/>
+                  <a:pt x="4992801" y="3020247"/>
+                </a:cubicBezTo>
+                <a:cubicBezTo>
+                  <a:pt x="4998517" y="3032637"/>
+                  <a:pt x="5013148" y="3051512"/>
+                  <a:pt x="5014805" y="3065434"/>
+                </a:cubicBezTo>
+                <a:cubicBezTo>
+                  <a:pt x="4998836" y="3057428"/>
+                  <a:pt x="5016840" y="3105196"/>
+                  <a:pt x="5002733" y="3103777"/>
+                </a:cubicBezTo>
+                <a:cubicBezTo>
+                  <a:pt x="5022381" y="3124610"/>
+                  <a:pt x="4997365" y="3128169"/>
+                  <a:pt x="5002941" y="3151828"/>
+                </a:cubicBezTo>
+                <a:cubicBezTo>
+                  <a:pt x="5010264" y="3163902"/>
+                  <a:pt x="5011356" y="3171780"/>
+                  <a:pt x="5002883" y="3180546"/>
+                </a:cubicBezTo>
+                <a:cubicBezTo>
+                  <a:pt x="5038586" y="3236545"/>
+                  <a:pt x="5003723" y="3210316"/>
+                  <a:pt x="5016711" y="3258677"/>
+                </a:cubicBezTo>
+                <a:lnTo>
+                  <a:pt x="5017918" y="3262610"/>
+                </a:lnTo>
+                <a:lnTo>
+                  <a:pt x="5011672" y="3277179"/>
+                </a:lnTo>
+                <a:lnTo>
+                  <a:pt x="5009344" y="3278130"/>
+                </a:lnTo>
+                <a:lnTo>
+                  <a:pt x="5026770" y="3325671"/>
+                </a:lnTo>
+                <a:lnTo>
+                  <a:pt x="5024571" y="3332072"/>
+                </a:lnTo>
+                <a:lnTo>
+                  <a:pt x="5041705" y="3362948"/>
+                </a:lnTo>
+                <a:lnTo>
+                  <a:pt x="5047477" y="3378959"/>
+                </a:lnTo>
+                <a:lnTo>
+                  <a:pt x="5060758" y="3407057"/>
+                </a:lnTo>
+                <a:lnTo>
+                  <a:pt x="5058968" y="3409825"/>
+                </a:lnTo>
+                <a:lnTo>
+                  <a:pt x="5062667" y="3415218"/>
+                </a:lnTo>
+                <a:lnTo>
+                  <a:pt x="5060928" y="3419880"/>
+                </a:lnTo>
+                <a:lnTo>
+                  <a:pt x="5062923" y="3424545"/>
+                </a:lnTo>
+                <a:cubicBezTo>
+                  <a:pt x="5063537" y="3433967"/>
+                  <a:pt x="5063494" y="3466028"/>
+                  <a:pt x="5064623" y="3476412"/>
+                </a:cubicBezTo>
+                <a:lnTo>
+                  <a:pt x="5069684" y="3486850"/>
+                </a:lnTo>
+                <a:lnTo>
+                  <a:pt x="5063339" y="3496391"/>
+                </a:lnTo>
+                <a:lnTo>
+                  <a:pt x="5070139" y="3531201"/>
+                </a:lnTo>
+                <a:lnTo>
+                  <a:pt x="5079896" y="3542019"/>
+                </a:lnTo>
+                <a:lnTo>
+                  <a:pt x="5087540" y="3552249"/>
+                </a:lnTo>
+                <a:lnTo>
+                  <a:pt x="5087902" y="3553678"/>
+                </a:lnTo>
+                <a:lnTo>
+                  <a:pt x="5091509" y="3568021"/>
+                </a:lnTo>
+                <a:lnTo>
+                  <a:pt x="5091934" y="3569719"/>
+                </a:lnTo>
+                <a:lnTo>
+                  <a:pt x="5089362" y="3586412"/>
+                </a:lnTo>
+                <a:lnTo>
+                  <a:pt x="5092358" y="3597336"/>
+                </a:lnTo>
+                <a:lnTo>
+                  <a:pt x="5084254" y="3606007"/>
+                </a:lnTo>
+                <a:cubicBezTo>
+                  <a:pt x="5084262" y="3617747"/>
+                  <a:pt x="5084273" y="3629488"/>
+                  <a:pt x="5084281" y="3641228"/>
+                </a:cubicBezTo>
+                <a:lnTo>
+                  <a:pt x="5091848" y="3653088"/>
+                </a:lnTo>
+                <a:lnTo>
+                  <a:pt x="5097436" y="3664114"/>
+                </a:lnTo>
+                <a:cubicBezTo>
+                  <a:pt x="5097463" y="3664599"/>
+                  <a:pt x="5097491" y="3665084"/>
+                  <a:pt x="5097518" y="3665569"/>
+                </a:cubicBezTo>
+                <a:cubicBezTo>
+                  <a:pt x="5097915" y="3672776"/>
+                  <a:pt x="5096966" y="3688591"/>
+                  <a:pt x="5099829" y="3707357"/>
+                </a:cubicBezTo>
+                <a:cubicBezTo>
+                  <a:pt x="5100505" y="3724716"/>
+                  <a:pt x="5118078" y="3760234"/>
+                  <a:pt x="5114696" y="3778166"/>
+                </a:cubicBezTo>
+                <a:cubicBezTo>
+                  <a:pt x="5141627" y="3845122"/>
+                  <a:pt x="5125427" y="3821305"/>
+                  <a:pt x="5135379" y="3878222"/>
+                </a:cubicBezTo>
+                <a:cubicBezTo>
+                  <a:pt x="5161519" y="3905047"/>
+                  <a:pt x="5125417" y="4015047"/>
+                  <a:pt x="5130138" y="4048117"/>
+                </a:cubicBezTo>
+                <a:cubicBezTo>
+                  <a:pt x="5081804" y="4192084"/>
+                  <a:pt x="5096262" y="4158987"/>
+                  <a:pt x="5090040" y="4219510"/>
+                </a:cubicBezTo>
+                <a:cubicBezTo>
+                  <a:pt x="5104553" y="4280033"/>
+                  <a:pt x="5065380" y="4345686"/>
+                  <a:pt x="5092812" y="4411258"/>
+                </a:cubicBezTo>
+                <a:cubicBezTo>
+                  <a:pt x="5090630" y="4437329"/>
+                  <a:pt x="5083878" y="4473140"/>
+                  <a:pt x="5084599" y="4488531"/>
+                </a:cubicBezTo>
+                <a:cubicBezTo>
+                  <a:pt x="5084423" y="4505410"/>
+                  <a:pt x="5084248" y="4522289"/>
+                  <a:pt x="5084072" y="4539168"/>
+                </a:cubicBezTo>
+                <a:cubicBezTo>
+                  <a:pt x="5072114" y="4567830"/>
+                  <a:pt x="5064305" y="4588197"/>
+                  <a:pt x="5068936" y="4625153"/>
+                </a:cubicBezTo>
+                <a:cubicBezTo>
+                  <a:pt x="5077433" y="4662889"/>
+                  <a:pt x="5065899" y="4679357"/>
+                  <a:pt x="5059114" y="4733115"/>
+                </a:cubicBezTo>
+                <a:cubicBezTo>
+                  <a:pt x="5068687" y="4752352"/>
+                  <a:pt x="5055370" y="4832308"/>
+                  <a:pt x="5037209" y="4844323"/>
+                </a:cubicBezTo>
+                <a:cubicBezTo>
+                  <a:pt x="5033444" y="4857054"/>
+                  <a:pt x="5040194" y="4871554"/>
+                  <a:pt x="5020638" y="4877992"/>
+                </a:cubicBezTo>
+                <a:cubicBezTo>
+                  <a:pt x="4997151" y="4888353"/>
+                  <a:pt x="5034418" y="4931200"/>
+                  <a:pt x="5006413" y="4925805"/>
+                </a:cubicBezTo>
+                <a:cubicBezTo>
+                  <a:pt x="5031964" y="4956261"/>
+                  <a:pt x="4982840" y="4982633"/>
+                  <a:pt x="4971037" y="5009272"/>
+                </a:cubicBezTo>
+                <a:cubicBezTo>
+                  <a:pt x="4973259" y="5034036"/>
+                  <a:pt x="4968375" y="5053859"/>
+                  <a:pt x="4963105" y="5111369"/>
+                </a:cubicBezTo>
+                <a:cubicBezTo>
+                  <a:pt x="4973224" y="5141336"/>
+                  <a:pt x="4937413" y="5161742"/>
+                  <a:pt x="4976341" y="5210876"/>
+                </a:cubicBezTo>
+                <a:cubicBezTo>
+                  <a:pt x="4972455" y="5212581"/>
+                  <a:pt x="4977054" y="5227501"/>
+                  <a:pt x="4980617" y="5269726"/>
+                </a:cubicBezTo>
+                <a:cubicBezTo>
+                  <a:pt x="4984182" y="5311951"/>
+                  <a:pt x="4990390" y="5400671"/>
+                  <a:pt x="4997733" y="5464225"/>
+                </a:cubicBezTo>
+                <a:cubicBezTo>
+                  <a:pt x="5001765" y="5536542"/>
+                  <a:pt x="4990225" y="5517959"/>
+                  <a:pt x="5001400" y="5594585"/>
+                </a:cubicBezTo>
+                <a:cubicBezTo>
+                  <a:pt x="4999908" y="5619318"/>
+                  <a:pt x="4974042" y="5647975"/>
+                  <a:pt x="4983700" y="5667896"/>
+                </a:cubicBezTo>
+                <a:cubicBezTo>
+                  <a:pt x="4976834" y="5696311"/>
+                  <a:pt x="4975579" y="5738356"/>
+                  <a:pt x="4968506" y="5769225"/>
+                </a:cubicBezTo>
+                <a:cubicBezTo>
+                  <a:pt x="4968926" y="5787258"/>
+                  <a:pt x="4969344" y="5805291"/>
+                  <a:pt x="4969765" y="5823324"/>
+                </a:cubicBezTo>
+                <a:cubicBezTo>
+                  <a:pt x="4966122" y="5853058"/>
+                  <a:pt x="4965608" y="5838948"/>
+                  <a:pt x="4966129" y="5862699"/>
+                </a:cubicBezTo>
+                <a:lnTo>
+                  <a:pt x="4970695" y="5906467"/>
+                </a:lnTo>
+                <a:lnTo>
+                  <a:pt x="4991568" y="5939847"/>
+                </a:lnTo>
+                <a:cubicBezTo>
+                  <a:pt x="4998848" y="5955713"/>
+                  <a:pt x="4974731" y="5940131"/>
+                  <a:pt x="4986815" y="5973994"/>
+                </a:cubicBezTo>
+                <a:cubicBezTo>
+                  <a:pt x="4961187" y="5997051"/>
+                  <a:pt x="4983444" y="6032039"/>
+                  <a:pt x="4987776" y="6089693"/>
+                </a:cubicBezTo>
+                <a:lnTo>
+                  <a:pt x="4991621" y="6224938"/>
+                </a:lnTo>
+                <a:cubicBezTo>
+                  <a:pt x="4988442" y="6270972"/>
+                  <a:pt x="5008962" y="6317522"/>
+                  <a:pt x="5017157" y="6370251"/>
+                </a:cubicBezTo>
+                <a:cubicBezTo>
+                  <a:pt x="5025353" y="6422980"/>
+                  <a:pt x="5039938" y="6490855"/>
+                  <a:pt x="5040797" y="6541313"/>
+                </a:cubicBezTo>
+                <a:cubicBezTo>
+                  <a:pt x="5039898" y="6576319"/>
+                  <a:pt x="5031912" y="6591883"/>
+                  <a:pt x="5045375" y="6640957"/>
+                </a:cubicBezTo>
+                <a:cubicBezTo>
+                  <a:pt x="5057505" y="6669536"/>
+                  <a:pt x="5052276" y="6675394"/>
+                  <a:pt x="5058442" y="6705297"/>
+                </a:cubicBezTo>
+                <a:cubicBezTo>
+                  <a:pt x="5057367" y="6727133"/>
+                  <a:pt x="5067901" y="6732087"/>
+                  <a:pt x="5071125" y="6759582"/>
+                </a:cubicBezTo>
+                <a:cubicBezTo>
+                  <a:pt x="5055614" y="6796071"/>
+                  <a:pt x="5051656" y="6769544"/>
+                  <a:pt x="5069172" y="6817746"/>
+                </a:cubicBezTo>
+                <a:cubicBezTo>
+                  <a:pt x="5060956" y="6828354"/>
+                  <a:pt x="5064525" y="6836369"/>
+                  <a:pt x="5072322" y="6843646"/>
+                </a:cubicBezTo>
+                <a:lnTo>
+                  <a:pt x="5091388" y="6857998"/>
+                </a:lnTo>
+                <a:lnTo>
+                  <a:pt x="6096000" y="6857998"/>
+                </a:lnTo>
+                <a:lnTo>
+                  <a:pt x="6096000" y="6858000"/>
+                </a:lnTo>
+                <a:lnTo>
+                  <a:pt x="0" y="6858000"/>
+                </a:lnTo>
+                <a:close/>
+              </a:path>
+            </a:pathLst>
+          </a:custGeom>
+          <a:solidFill>
+            <a:srgbClr val="82766A">
+              <a:alpha val="15000"/>
+            </a:srgbClr>
+          </a:solidFill>
+          <a:ln>
+            <a:noFill/>
+          </a:ln>
+        </p:spPr>
+        <p:style>
+          <a:lnRef idx="2">
+            <a:schemeClr val="accent1">
+              <a:shade val="50000"/>
+            </a:schemeClr>
+          </a:lnRef>
+          <a:fillRef idx="1">
+            <a:schemeClr val="accent1"/>
+          </a:fillRef>
+          <a:effectRef idx="0">
+            <a:schemeClr val="accent1"/>
+          </a:effectRef>
+          <a:fontRef idx="minor">
+            <a:schemeClr val="lt1"/>
+          </a:fontRef>
+        </p:style>
+        <p:txBody>
+          <a:bodyPr wrap="square" rtlCol="0" anchor="ctr">
+            <a:noAutofit/>
+          </a:bodyPr>
+          <a:lstStyle/>
+          <a:p>
+            <a:pPr algn="ctr"/>
+            <a:endParaRPr lang="en-US"/>
+          </a:p>
+        </p:txBody>
+      </p:sp>
+      <p:sp>
+        <p:nvSpPr>
+          <p:cNvPr id="2" name="Title 1">
+            <a:extLst>
+              <a:ext uri="{FF2B5EF4-FFF2-40B4-BE49-F238E27FC236}">
+                <a16:creationId xmlns:a16="http://schemas.microsoft.com/office/drawing/2014/main" id="{3E091CFA-106B-A054-2CD4-B0166D6D45A8}"/>
+              </a:ext>
+            </a:extLst>
+          </p:cNvPr>
+          <p:cNvSpPr>
+            <a:spLocks noGrp="1"/>
+          </p:cNvSpPr>
+          <p:nvPr>
+            <p:ph type="title"/>
+          </p:nvPr>
+        </p:nvSpPr>
+        <p:spPr>
+          <a:xfrm>
+            <a:off x="6653356" y="255638"/>
+            <a:ext cx="3739341" cy="1330839"/>
+          </a:xfrm>
+        </p:spPr>
+        <p:txBody>
+          <a:bodyPr vert="horz" lIns="91440" tIns="45720" rIns="91440" bIns="45720" rtlCol="0" anchor="ctr">
+            <a:normAutofit/>
+          </a:bodyPr>
+          <a:lstStyle/>
+          <a:p>
+            <a:r>
+              <a:rPr lang="en-US" kern="1200" dirty="0">
+                <a:solidFill>
+                  <a:schemeClr val="tx1"/>
+                </a:solidFill>
+                <a:latin typeface="+mj-lt"/>
+                <a:ea typeface="+mj-ea"/>
+                <a:cs typeface="+mj-cs"/>
+              </a:rPr>
+              <a:t>Testing e </a:t>
+            </a:r>
+            <a:r>
+              <a:rPr lang="en-US" kern="1200" dirty="0" err="1">
+                <a:solidFill>
+                  <a:schemeClr val="tx1"/>
+                </a:solidFill>
+                <a:latin typeface="+mj-lt"/>
+                <a:ea typeface="+mj-ea"/>
+                <a:cs typeface="+mj-cs"/>
+              </a:rPr>
+              <a:t>predizione</a:t>
+            </a:r>
+            <a:endParaRPr lang="en-US" kern="1200" dirty="0">
+              <a:solidFill>
+                <a:schemeClr val="tx1"/>
+              </a:solidFill>
+              <a:latin typeface="+mj-lt"/>
+              <a:ea typeface="+mj-ea"/>
+              <a:cs typeface="+mj-cs"/>
+            </a:endParaRPr>
+          </a:p>
+        </p:txBody>
+      </p:sp>
+      <p:sp>
+        <p:nvSpPr>
+          <p:cNvPr id="7" name="TextBox 6">
+            <a:extLst>
+              <a:ext uri="{FF2B5EF4-FFF2-40B4-BE49-F238E27FC236}">
+                <a16:creationId xmlns:a16="http://schemas.microsoft.com/office/drawing/2014/main" id="{39155CD4-942C-1A93-B7D0-0ED335544AE6}"/>
+              </a:ext>
+            </a:extLst>
+          </p:cNvPr>
+          <p:cNvSpPr txBox="1"/>
+          <p:nvPr/>
+        </p:nvSpPr>
+        <p:spPr>
+          <a:xfrm>
+            <a:off x="98323" y="921058"/>
+            <a:ext cx="4581831" cy="5678129"/>
+          </a:xfrm>
+          <a:prstGeom prst="rect">
+            <a:avLst/>
+          </a:prstGeom>
+        </p:spPr>
+        <p:txBody>
+          <a:bodyPr vert="horz" lIns="91440" tIns="45720" rIns="91440" bIns="45720" rtlCol="0">
+            <a:noAutofit/>
+          </a:bodyPr>
+          <a:lstStyle/>
+          <a:p>
+            <a:pPr indent="-228600">
+              <a:lnSpc>
+                <a:spcPct val="90000"/>
+              </a:lnSpc>
+              <a:spcAft>
+                <a:spcPts val="600"/>
+              </a:spcAft>
+              <a:buFont typeface="Arial" panose="020B0604020202020204" pitchFamily="34" charset="0"/>
+              <a:buChar char="•"/>
+            </a:pPr>
+            <a:r>
+              <a:rPr lang="en-US" dirty="0"/>
+              <a:t>1/1 [==============================] - 0s 166ms/step</a:t>
+            </a:r>
+          </a:p>
+          <a:p>
+            <a:pPr indent="-228600">
+              <a:lnSpc>
+                <a:spcPct val="90000"/>
+              </a:lnSpc>
+              <a:spcAft>
+                <a:spcPts val="600"/>
+              </a:spcAft>
+              <a:buFont typeface="Arial" panose="020B0604020202020204" pitchFamily="34" charset="0"/>
+              <a:buChar char="•"/>
+            </a:pPr>
+            <a:r>
+              <a:rPr lang="en-US" dirty="0"/>
+              <a:t>Zero</a:t>
+            </a:r>
+          </a:p>
+          <a:p>
+            <a:pPr indent="-228600">
+              <a:lnSpc>
+                <a:spcPct val="90000"/>
+              </a:lnSpc>
+              <a:spcAft>
+                <a:spcPts val="600"/>
+              </a:spcAft>
+              <a:buFont typeface="Arial" panose="020B0604020202020204" pitchFamily="34" charset="0"/>
+              <a:buChar char="•"/>
+            </a:pPr>
+            <a:r>
+              <a:rPr lang="en-US" dirty="0"/>
+              <a:t>1/1 [==============================] - 0s 30ms/step</a:t>
+            </a:r>
+          </a:p>
+          <a:p>
+            <a:pPr indent="-228600">
+              <a:lnSpc>
+                <a:spcPct val="90000"/>
+              </a:lnSpc>
+              <a:spcAft>
+                <a:spcPts val="600"/>
+              </a:spcAft>
+              <a:buFont typeface="Arial" panose="020B0604020202020204" pitchFamily="34" charset="0"/>
+              <a:buChar char="•"/>
+            </a:pPr>
+            <a:r>
+              <a:rPr lang="en-US" dirty="0"/>
+              <a:t>Six</a:t>
+            </a:r>
+          </a:p>
+          <a:p>
+            <a:pPr indent="-228600">
+              <a:lnSpc>
+                <a:spcPct val="90000"/>
+              </a:lnSpc>
+              <a:spcAft>
+                <a:spcPts val="600"/>
+              </a:spcAft>
+              <a:buFont typeface="Arial" panose="020B0604020202020204" pitchFamily="34" charset="0"/>
+              <a:buChar char="•"/>
+            </a:pPr>
+            <a:r>
+              <a:rPr lang="en-US" dirty="0"/>
+              <a:t>1/1 [==============================] - 0s 25ms/step</a:t>
+            </a:r>
+          </a:p>
+          <a:p>
+            <a:pPr indent="-228600">
+              <a:lnSpc>
+                <a:spcPct val="90000"/>
+              </a:lnSpc>
+              <a:spcAft>
+                <a:spcPts val="600"/>
+              </a:spcAft>
+              <a:buFont typeface="Arial" panose="020B0604020202020204" pitchFamily="34" charset="0"/>
+              <a:buChar char="•"/>
+            </a:pPr>
+            <a:r>
+              <a:rPr lang="en-US" dirty="0"/>
+              <a:t>Nine</a:t>
+            </a:r>
+          </a:p>
+          <a:p>
+            <a:pPr indent="-228600">
+              <a:lnSpc>
+                <a:spcPct val="90000"/>
+              </a:lnSpc>
+              <a:spcAft>
+                <a:spcPts val="600"/>
+              </a:spcAft>
+              <a:buFont typeface="Arial" panose="020B0604020202020204" pitchFamily="34" charset="0"/>
+              <a:buChar char="•"/>
+            </a:pPr>
+            <a:r>
+              <a:rPr lang="en-US" dirty="0"/>
+              <a:t>1/1 [==============================] - 0s 32ms/step</a:t>
+            </a:r>
+          </a:p>
+          <a:p>
+            <a:pPr indent="-228600">
+              <a:lnSpc>
+                <a:spcPct val="90000"/>
+              </a:lnSpc>
+              <a:spcAft>
+                <a:spcPts val="600"/>
+              </a:spcAft>
+              <a:buFont typeface="Arial" panose="020B0604020202020204" pitchFamily="34" charset="0"/>
+              <a:buChar char="•"/>
+            </a:pPr>
+            <a:r>
+              <a:rPr lang="en-US" dirty="0"/>
+              <a:t>Nine</a:t>
+            </a:r>
+          </a:p>
+          <a:p>
+            <a:pPr indent="-228600">
+              <a:lnSpc>
+                <a:spcPct val="90000"/>
+              </a:lnSpc>
+              <a:spcAft>
+                <a:spcPts val="600"/>
+              </a:spcAft>
+              <a:buFont typeface="Arial" panose="020B0604020202020204" pitchFamily="34" charset="0"/>
+              <a:buChar char="•"/>
+            </a:pPr>
+            <a:r>
+              <a:rPr lang="en-US" dirty="0"/>
+              <a:t>1/1 [==============================] - 0s 27ms/step</a:t>
+            </a:r>
+          </a:p>
+          <a:p>
+            <a:pPr indent="-228600">
+              <a:lnSpc>
+                <a:spcPct val="90000"/>
+              </a:lnSpc>
+              <a:spcAft>
+                <a:spcPts val="600"/>
+              </a:spcAft>
+              <a:buFont typeface="Arial" panose="020B0604020202020204" pitchFamily="34" charset="0"/>
+              <a:buChar char="•"/>
+            </a:pPr>
+            <a:r>
+              <a:rPr lang="en-US" dirty="0"/>
+              <a:t>Zero</a:t>
+            </a:r>
+          </a:p>
+          <a:p>
+            <a:pPr indent="-228600">
+              <a:lnSpc>
+                <a:spcPct val="90000"/>
+              </a:lnSpc>
+              <a:spcAft>
+                <a:spcPts val="600"/>
+              </a:spcAft>
+              <a:buFont typeface="Arial" panose="020B0604020202020204" pitchFamily="34" charset="0"/>
+              <a:buChar char="•"/>
+            </a:pPr>
+            <a:r>
+              <a:rPr lang="en-US" dirty="0"/>
+              <a:t>1/1 [==============================] - 0s 29ms/step</a:t>
+            </a:r>
+          </a:p>
+          <a:p>
+            <a:pPr indent="-228600">
+              <a:lnSpc>
+                <a:spcPct val="90000"/>
+              </a:lnSpc>
+              <a:spcAft>
+                <a:spcPts val="600"/>
+              </a:spcAft>
+              <a:buFont typeface="Arial" panose="020B0604020202020204" pitchFamily="34" charset="0"/>
+              <a:buChar char="•"/>
+            </a:pPr>
+            <a:r>
+              <a:rPr lang="en-US" dirty="0"/>
+              <a:t>bird</a:t>
+            </a:r>
+          </a:p>
+        </p:txBody>
+      </p:sp>
+      <p:pic>
+        <p:nvPicPr>
+          <p:cNvPr id="5" name="Content Placeholder 4">
+            <a:extLst>
+              <a:ext uri="{FF2B5EF4-FFF2-40B4-BE49-F238E27FC236}">
+                <a16:creationId xmlns:a16="http://schemas.microsoft.com/office/drawing/2014/main" id="{9A107E1A-A141-5006-BF19-6172E4FE8DF0}"/>
+              </a:ext>
+            </a:extLst>
+          </p:cNvPr>
+          <p:cNvPicPr>
+            <a:picLocks noGrp="1" noChangeAspect="1"/>
+          </p:cNvPicPr>
+          <p:nvPr>
+            <p:ph idx="1"/>
+          </p:nvPr>
+        </p:nvPicPr>
+        <p:blipFill>
+          <a:blip r:embed="rId2"/>
+          <a:stretch>
+            <a:fillRect/>
+          </a:stretch>
+        </p:blipFill>
+        <p:spPr>
+          <a:xfrm>
+            <a:off x="5445457" y="2186760"/>
+            <a:ext cx="6155141" cy="2508220"/>
+          </a:xfrm>
+          <a:prstGeom prst="rect">
+            <a:avLst/>
+          </a:prstGeom>
+        </p:spPr>
+      </p:pic>
+    </p:spTree>
+    <p:extLst>
+      <p:ext uri="{BB962C8B-B14F-4D97-AF65-F5344CB8AC3E}">
+        <p14:creationId xmlns:p14="http://schemas.microsoft.com/office/powerpoint/2010/main" val="2256762576"/>
+      </p:ext>
+    </p:extLst>
+  </p:cSld>
+  <p:clrMapOvr>
+    <a:masterClrMapping/>
+  </p:clrMapOvr>
+</p:sld>
+</file>
+
+<file path=ppt/slides/slide6.xml><?xml version="1.0" encoding="utf-8"?>
+<p:sld xmlns:a="http://schemas.openxmlformats.org/drawingml/2006/main" xmlns:r="http://schemas.openxmlformats.org/officeDocument/2006/relationships" xmlns:p="http://schemas.openxmlformats.org/presentationml/2006/main">
+  <p:cSld>
+    <p:bg>
+      <p:bgPr>
+        <a:solidFill>
+          <a:schemeClr val="bg1"/>
+        </a:solidFill>
+        <a:effectLst/>
+      </p:bgPr>
+    </p:bg>
+    <p:spTree>
+      <p:nvGrpSpPr>
+        <p:cNvPr id="1" name=""/>
+        <p:cNvGrpSpPr/>
+        <p:nvPr/>
+      </p:nvGrpSpPr>
+      <p:grpSpPr>
+        <a:xfrm>
+          <a:off x="0" y="0"/>
+          <a:ext cx="0" cy="0"/>
+          <a:chOff x="0" y="0"/>
+          <a:chExt cx="0" cy="0"/>
+        </a:xfrm>
+      </p:grpSpPr>
+      <p:sp useBgFill="1">
+        <p:nvSpPr>
           <p:cNvPr id="9" name="Rectangle 8">
             <a:extLst>
               <a:ext uri="{FF2B5EF4-FFF2-40B4-BE49-F238E27FC236}">
@@ -9344,7 +11384,7 @@
             <p:ph idx="1"/>
             <p:extLst>
               <p:ext uri="{D42A27DB-BD31-4B8C-83A1-F6EECF244321}">
-                <p14:modId xmlns:p14="http://schemas.microsoft.com/office/powerpoint/2010/main" val="3771814431"/>
+                <p14:modId xmlns:p14="http://schemas.microsoft.com/office/powerpoint/2010/main" val="2698586953"/>
               </p:ext>
             </p:extLst>
           </p:nvPr>
@@ -9363,6 +11403,714 @@
     <p:extLst>
       <p:ext uri="{BB962C8B-B14F-4D97-AF65-F5344CB8AC3E}">
         <p14:creationId xmlns:p14="http://schemas.microsoft.com/office/powerpoint/2010/main" val="3955126079"/>
+      </p:ext>
+    </p:extLst>
+  </p:cSld>
+  <p:clrMapOvr>
+    <a:masterClrMapping/>
+  </p:clrMapOvr>
+</p:sld>
+</file>
+
+<file path=ppt/slides/slide7.xml><?xml version="1.0" encoding="utf-8"?>
+<p:sld xmlns:a="http://schemas.openxmlformats.org/drawingml/2006/main" xmlns:r="http://schemas.openxmlformats.org/officeDocument/2006/relationships" xmlns:p="http://schemas.openxmlformats.org/presentationml/2006/main">
+  <p:cSld>
+    <p:bg>
+      <p:bgPr>
+        <a:solidFill>
+          <a:schemeClr val="bg1"/>
+        </a:solidFill>
+        <a:effectLst/>
+      </p:bgPr>
+    </p:bg>
+    <p:spTree>
+      <p:nvGrpSpPr>
+        <p:cNvPr id="1" name=""/>
+        <p:cNvGrpSpPr/>
+        <p:nvPr/>
+      </p:nvGrpSpPr>
+      <p:grpSpPr>
+        <a:xfrm>
+          <a:off x="0" y="0"/>
+          <a:ext cx="0" cy="0"/>
+          <a:chOff x="0" y="0"/>
+          <a:chExt cx="0" cy="0"/>
+        </a:xfrm>
+      </p:grpSpPr>
+      <p:sp useBgFill="1">
+        <p:nvSpPr>
+          <p:cNvPr id="13" name="Rectangle 12">
+            <a:extLst>
+              <a:ext uri="{FF2B5EF4-FFF2-40B4-BE49-F238E27FC236}">
+                <a16:creationId xmlns:a16="http://schemas.microsoft.com/office/drawing/2014/main" id="{32D45EE4-C4F0-4F72-B1C6-39F596D138A9}"/>
+              </a:ext>
+              <a:ext uri="{C183D7F6-B498-43B3-948B-1728B52AA6E4}">
+                <adec:decorative xmlns:adec="http://schemas.microsoft.com/office/drawing/2017/decorative" val="1"/>
+              </a:ext>
+            </a:extLst>
+          </p:cNvPr>
+          <p:cNvSpPr>
+            <a:spLocks noGrp="1" noRot="1" noChangeAspect="1" noMove="1" noResize="1" noEditPoints="1" noAdjustHandles="1" noChangeArrowheads="1" noChangeShapeType="1" noTextEdit="1"/>
+          </p:cNvSpPr>
+          <p:nvPr>
+            <p:extLst>
+              <p:ext uri="{386F3935-93C4-4BCD-93E2-E3B085C9AB24}">
+                <p16:designElem xmlns:p16="http://schemas.microsoft.com/office/powerpoint/2015/main" val="1"/>
+              </p:ext>
+            </p:extLst>
+          </p:nvPr>
+        </p:nvSpPr>
+        <p:spPr>
+          <a:xfrm>
+            <a:off x="0" y="0"/>
+            <a:ext cx="12188952" cy="6858000"/>
+          </a:xfrm>
+          <a:prstGeom prst="rect">
+            <a:avLst/>
+          </a:prstGeom>
+          <a:ln>
+            <a:noFill/>
+          </a:ln>
+        </p:spPr>
+        <p:style>
+          <a:lnRef idx="2">
+            <a:schemeClr val="accent1">
+              <a:shade val="50000"/>
+            </a:schemeClr>
+          </a:lnRef>
+          <a:fillRef idx="1">
+            <a:schemeClr val="accent1"/>
+          </a:fillRef>
+          <a:effectRef idx="0">
+            <a:schemeClr val="accent1"/>
+          </a:effectRef>
+          <a:fontRef idx="minor">
+            <a:schemeClr val="lt1"/>
+          </a:fontRef>
+        </p:style>
+        <p:txBody>
+          <a:bodyPr rtlCol="0" anchor="ctr"/>
+          <a:lstStyle/>
+          <a:p>
+            <a:pPr algn="ctr"/>
+            <a:endParaRPr lang="en-US"/>
+          </a:p>
+        </p:txBody>
+      </p:sp>
+      <p:sp>
+        <p:nvSpPr>
+          <p:cNvPr id="14" name="Oval 7">
+            <a:extLst>
+              <a:ext uri="{FF2B5EF4-FFF2-40B4-BE49-F238E27FC236}">
+                <a16:creationId xmlns:a16="http://schemas.microsoft.com/office/drawing/2014/main" id="{8C459BAD-4279-4A9D-B0C5-662C5F5ED21F}"/>
+              </a:ext>
+              <a:ext uri="{C183D7F6-B498-43B3-948B-1728B52AA6E4}">
+                <adec:decorative xmlns:adec="http://schemas.microsoft.com/office/drawing/2017/decorative" val="1"/>
+              </a:ext>
+            </a:extLst>
+          </p:cNvPr>
+          <p:cNvSpPr>
+            <a:spLocks noGrp="1" noRot="1" noChangeAspect="1" noMove="1" noResize="1" noEditPoints="1" noAdjustHandles="1" noChangeArrowheads="1" noChangeShapeType="1" noTextEdit="1"/>
+          </p:cNvSpPr>
+          <p:nvPr>
+            <p:extLst>
+              <p:ext uri="{386F3935-93C4-4BCD-93E2-E3B085C9AB24}">
+                <p16:designElem xmlns:p16="http://schemas.microsoft.com/office/powerpoint/2015/main" val="1"/>
+              </p:ext>
+            </p:extLst>
+          </p:nvPr>
+        </p:nvSpPr>
+        <p:spPr>
+          <a:xfrm rot="5400000" flipV="1">
+            <a:off x="3203463" y="-2060461"/>
+            <a:ext cx="5649003" cy="10651671"/>
+          </a:xfrm>
+          <a:custGeom>
+            <a:avLst/>
+            <a:gdLst>
+              <a:gd name="connsiteX0" fmla="*/ 0 w 5649003"/>
+              <a:gd name="connsiteY0" fmla="*/ 5325836 h 10651671"/>
+              <a:gd name="connsiteX1" fmla="*/ 2824502 w 5649003"/>
+              <a:gd name="connsiteY1" fmla="*/ 0 h 10651671"/>
+              <a:gd name="connsiteX2" fmla="*/ 5649004 w 5649003"/>
+              <a:gd name="connsiteY2" fmla="*/ 5325836 h 10651671"/>
+              <a:gd name="connsiteX3" fmla="*/ 2824502 w 5649003"/>
+              <a:gd name="connsiteY3" fmla="*/ 10651672 h 10651671"/>
+              <a:gd name="connsiteX4" fmla="*/ 0 w 5649003"/>
+              <a:gd name="connsiteY4" fmla="*/ 5325836 h 10651671"/>
+            </a:gdLst>
+            <a:ahLst/>
+            <a:cxnLst>
+              <a:cxn ang="0">
+                <a:pos x="connsiteX0" y="connsiteY0"/>
+              </a:cxn>
+              <a:cxn ang="0">
+                <a:pos x="connsiteX1" y="connsiteY1"/>
+              </a:cxn>
+              <a:cxn ang="0">
+                <a:pos x="connsiteX2" y="connsiteY2"/>
+              </a:cxn>
+              <a:cxn ang="0">
+                <a:pos x="connsiteX3" y="connsiteY3"/>
+              </a:cxn>
+              <a:cxn ang="0">
+                <a:pos x="connsiteX4" y="connsiteY4"/>
+              </a:cxn>
+            </a:cxnLst>
+            <a:rect l="l" t="t" r="r" b="b"/>
+            <a:pathLst>
+              <a:path w="5649003" h="10651671" fill="none" extrusionOk="0">
+                <a:moveTo>
+                  <a:pt x="0" y="5325836"/>
+                </a:moveTo>
+                <a:cubicBezTo>
+                  <a:pt x="186946" y="2320485"/>
+                  <a:pt x="1438121" y="-52385"/>
+                  <a:pt x="2824502" y="0"/>
+                </a:cubicBezTo>
+                <a:cubicBezTo>
+                  <a:pt x="4703838" y="-43168"/>
+                  <a:pt x="5583840" y="2369660"/>
+                  <a:pt x="5649004" y="5325836"/>
+                </a:cubicBezTo>
+                <a:cubicBezTo>
+                  <a:pt x="5518761" y="8289338"/>
+                  <a:pt x="4285196" y="10894014"/>
+                  <a:pt x="2824502" y="10651672"/>
+                </a:cubicBezTo>
+                <a:cubicBezTo>
+                  <a:pt x="1536945" y="11016699"/>
+                  <a:pt x="142947" y="8418643"/>
+                  <a:pt x="0" y="5325836"/>
+                </a:cubicBezTo>
+                <a:close/>
+              </a:path>
+              <a:path w="5649003" h="10651671" stroke="0" extrusionOk="0">
+                <a:moveTo>
+                  <a:pt x="0" y="5325836"/>
+                </a:moveTo>
+                <a:cubicBezTo>
+                  <a:pt x="-54350" y="2332108"/>
+                  <a:pt x="1351726" y="167869"/>
+                  <a:pt x="2824502" y="0"/>
+                </a:cubicBezTo>
+                <a:cubicBezTo>
+                  <a:pt x="4182679" y="-143942"/>
+                  <a:pt x="5672665" y="2549517"/>
+                  <a:pt x="5649004" y="5325836"/>
+                </a:cubicBezTo>
+                <a:cubicBezTo>
+                  <a:pt x="5518596" y="8280244"/>
+                  <a:pt x="4081190" y="10622204"/>
+                  <a:pt x="2824502" y="10651672"/>
+                </a:cubicBezTo>
+                <a:cubicBezTo>
+                  <a:pt x="1216708" y="10537144"/>
+                  <a:pt x="-100850" y="8264979"/>
+                  <a:pt x="0" y="5325836"/>
+                </a:cubicBezTo>
+                <a:close/>
+              </a:path>
+            </a:pathLst>
+          </a:custGeom>
+          <a:solidFill>
+            <a:schemeClr val="accent2"/>
+          </a:solidFill>
+          <a:ln w="57150">
+            <a:solidFill>
+              <a:schemeClr val="accent2"/>
+            </a:solidFill>
+            <a:extLst>
+              <a:ext uri="{C807C97D-BFC1-408E-A445-0C87EB9F89A2}">
+                <ask:lineSketchStyleProps xmlns:ask="http://schemas.microsoft.com/office/drawing/2018/sketchyshapes" sd="63743190">
+                  <a:prstGeom prst="ellipse">
+                    <a:avLst/>
+                  </a:prstGeom>
+                  <ask:type>
+                    <ask:lineSketchCurved/>
+                  </ask:type>
+                </ask:lineSketchStyleProps>
+              </a:ext>
+            </a:extLst>
+          </a:ln>
+        </p:spPr>
+        <p:style>
+          <a:lnRef idx="2">
+            <a:schemeClr val="accent1">
+              <a:shade val="50000"/>
+            </a:schemeClr>
+          </a:lnRef>
+          <a:fillRef idx="1">
+            <a:schemeClr val="accent1"/>
+          </a:fillRef>
+          <a:effectRef idx="0">
+            <a:schemeClr val="accent1"/>
+          </a:effectRef>
+          <a:fontRef idx="minor">
+            <a:schemeClr val="lt1"/>
+          </a:fontRef>
+        </p:style>
+        <p:txBody>
+          <a:bodyPr rtlCol="0" anchor="ctr"/>
+          <a:lstStyle/>
+          <a:p>
+            <a:pPr algn="ctr"/>
+            <a:endParaRPr lang="en-US" dirty="0"/>
+          </a:p>
+        </p:txBody>
+      </p:sp>
+      <p:sp>
+        <p:nvSpPr>
+          <p:cNvPr id="2" name="Title 1">
+            <a:extLst>
+              <a:ext uri="{FF2B5EF4-FFF2-40B4-BE49-F238E27FC236}">
+                <a16:creationId xmlns:a16="http://schemas.microsoft.com/office/drawing/2014/main" id="{DBB6784C-0D03-3F4F-F121-11684A3B46C3}"/>
+              </a:ext>
+            </a:extLst>
+          </p:cNvPr>
+          <p:cNvSpPr>
+            <a:spLocks noGrp="1"/>
+          </p:cNvSpPr>
+          <p:nvPr>
+            <p:ph type="ctrTitle"/>
+          </p:nvPr>
+        </p:nvSpPr>
+        <p:spPr>
+          <a:xfrm>
+            <a:off x="2066544" y="1911096"/>
+            <a:ext cx="8055864" cy="2076651"/>
+          </a:xfrm>
+        </p:spPr>
+        <p:txBody>
+          <a:bodyPr anchor="b">
+            <a:normAutofit/>
+          </a:bodyPr>
+          <a:lstStyle/>
+          <a:p>
+            <a:r>
+              <a:rPr lang="it-IT" sz="6600" dirty="0">
+                <a:solidFill>
+                  <a:srgbClr val="FFFFFF"/>
+                </a:solidFill>
+              </a:rPr>
+              <a:t>Grazie per l’attenzione!</a:t>
+            </a:r>
+            <a:br>
+              <a:rPr lang="it-IT" sz="6600" dirty="0">
+                <a:solidFill>
+                  <a:srgbClr val="FFFFFF"/>
+                </a:solidFill>
+              </a:rPr>
+            </a:br>
+            <a:endParaRPr lang="en-US" sz="6600" dirty="0">
+              <a:solidFill>
+                <a:srgbClr val="FFFFFF"/>
+              </a:solidFill>
+            </a:endParaRPr>
+          </a:p>
+        </p:txBody>
+      </p:sp>
+      <p:sp>
+        <p:nvSpPr>
+          <p:cNvPr id="3" name="Subtitle 2">
+            <a:extLst>
+              <a:ext uri="{FF2B5EF4-FFF2-40B4-BE49-F238E27FC236}">
+                <a16:creationId xmlns:a16="http://schemas.microsoft.com/office/drawing/2014/main" id="{2F9D178F-0DF0-6EF9-0AE6-4D467F3FCB40}"/>
+              </a:ext>
+            </a:extLst>
+          </p:cNvPr>
+          <p:cNvSpPr>
+            <a:spLocks noGrp="1"/>
+          </p:cNvSpPr>
+          <p:nvPr>
+            <p:ph type="subTitle" idx="1"/>
+          </p:nvPr>
+        </p:nvSpPr>
+        <p:spPr>
+          <a:xfrm>
+            <a:off x="3227832" y="4353507"/>
+            <a:ext cx="5733288" cy="932688"/>
+          </a:xfrm>
+        </p:spPr>
+        <p:txBody>
+          <a:bodyPr>
+            <a:normAutofit/>
+          </a:bodyPr>
+          <a:lstStyle/>
+          <a:p>
+            <a:r>
+              <a:rPr lang="it-IT">
+                <a:solidFill>
+                  <a:srgbClr val="FFFFFF"/>
+                </a:solidFill>
+              </a:rPr>
+              <a:t>Stefano Carobene</a:t>
+            </a:r>
+          </a:p>
+          <a:p>
+            <a:r>
+              <a:rPr lang="it-IT">
+                <a:solidFill>
+                  <a:srgbClr val="FFFFFF"/>
+                </a:solidFill>
+              </a:rPr>
+              <a:t>ML-2022/24</a:t>
+            </a:r>
+            <a:endParaRPr lang="en-US">
+              <a:solidFill>
+                <a:srgbClr val="FFFFFF"/>
+              </a:solidFill>
+            </a:endParaRPr>
+          </a:p>
+        </p:txBody>
+      </p:sp>
+      <p:sp>
+        <p:nvSpPr>
+          <p:cNvPr id="12" name="sketch line">
+            <a:extLst>
+              <a:ext uri="{FF2B5EF4-FFF2-40B4-BE49-F238E27FC236}">
+                <a16:creationId xmlns:a16="http://schemas.microsoft.com/office/drawing/2014/main" id="{0953BC39-9D68-40BE-BF3C-5C4EB782AF94}"/>
+              </a:ext>
+              <a:ext uri="{C183D7F6-B498-43B3-948B-1728B52AA6E4}">
+                <adec:decorative xmlns:adec="http://schemas.microsoft.com/office/drawing/2017/decorative" val="1"/>
+              </a:ext>
+            </a:extLst>
+          </p:cNvPr>
+          <p:cNvSpPr>
+            <a:spLocks noGrp="1" noRot="1" noChangeAspect="1" noMove="1" noResize="1" noEditPoints="1" noAdjustHandles="1" noChangeArrowheads="1" noChangeShapeType="1" noTextEdit="1"/>
+          </p:cNvSpPr>
+          <p:nvPr>
+            <p:extLst>
+              <p:ext uri="{386F3935-93C4-4BCD-93E2-E3B085C9AB24}">
+                <p16:designElem xmlns:p16="http://schemas.microsoft.com/office/powerpoint/2015/main" val="1"/>
+              </p:ext>
+            </p:extLst>
+          </p:nvPr>
+        </p:nvSpPr>
+        <p:spPr>
+          <a:xfrm>
+            <a:off x="3974206" y="4173498"/>
+            <a:ext cx="4243589" cy="18288"/>
+          </a:xfrm>
+          <a:custGeom>
+            <a:avLst/>
+            <a:gdLst>
+              <a:gd name="connsiteX0" fmla="*/ 0 w 4243589"/>
+              <a:gd name="connsiteY0" fmla="*/ 0 h 18288"/>
+              <a:gd name="connsiteX1" fmla="*/ 563791 w 4243589"/>
+              <a:gd name="connsiteY1" fmla="*/ 0 h 18288"/>
+              <a:gd name="connsiteX2" fmla="*/ 1042710 w 4243589"/>
+              <a:gd name="connsiteY2" fmla="*/ 0 h 18288"/>
+              <a:gd name="connsiteX3" fmla="*/ 1564066 w 4243589"/>
+              <a:gd name="connsiteY3" fmla="*/ 0 h 18288"/>
+              <a:gd name="connsiteX4" fmla="*/ 2212729 w 4243589"/>
+              <a:gd name="connsiteY4" fmla="*/ 0 h 18288"/>
+              <a:gd name="connsiteX5" fmla="*/ 2776520 w 4243589"/>
+              <a:gd name="connsiteY5" fmla="*/ 0 h 18288"/>
+              <a:gd name="connsiteX6" fmla="*/ 3297875 w 4243589"/>
+              <a:gd name="connsiteY6" fmla="*/ 0 h 18288"/>
+              <a:gd name="connsiteX7" fmla="*/ 4243589 w 4243589"/>
+              <a:gd name="connsiteY7" fmla="*/ 0 h 18288"/>
+              <a:gd name="connsiteX8" fmla="*/ 4243589 w 4243589"/>
+              <a:gd name="connsiteY8" fmla="*/ 18288 h 18288"/>
+              <a:gd name="connsiteX9" fmla="*/ 3637362 w 4243589"/>
+              <a:gd name="connsiteY9" fmla="*/ 18288 h 18288"/>
+              <a:gd name="connsiteX10" fmla="*/ 3116007 w 4243589"/>
+              <a:gd name="connsiteY10" fmla="*/ 18288 h 18288"/>
+              <a:gd name="connsiteX11" fmla="*/ 2424908 w 4243589"/>
+              <a:gd name="connsiteY11" fmla="*/ 18288 h 18288"/>
+              <a:gd name="connsiteX12" fmla="*/ 1861117 w 4243589"/>
+              <a:gd name="connsiteY12" fmla="*/ 18288 h 18288"/>
+              <a:gd name="connsiteX13" fmla="*/ 1382198 w 4243589"/>
+              <a:gd name="connsiteY13" fmla="*/ 18288 h 18288"/>
+              <a:gd name="connsiteX14" fmla="*/ 733535 w 4243589"/>
+              <a:gd name="connsiteY14" fmla="*/ 18288 h 18288"/>
+              <a:gd name="connsiteX15" fmla="*/ 0 w 4243589"/>
+              <a:gd name="connsiteY15" fmla="*/ 18288 h 18288"/>
+              <a:gd name="connsiteX16" fmla="*/ 0 w 4243589"/>
+              <a:gd name="connsiteY16" fmla="*/ 0 h 18288"/>
+            </a:gdLst>
+            <a:ahLst/>
+            <a:cxnLst>
+              <a:cxn ang="0">
+                <a:pos x="connsiteX0" y="connsiteY0"/>
+              </a:cxn>
+              <a:cxn ang="0">
+                <a:pos x="connsiteX1" y="connsiteY1"/>
+              </a:cxn>
+              <a:cxn ang="0">
+                <a:pos x="connsiteX2" y="connsiteY2"/>
+              </a:cxn>
+              <a:cxn ang="0">
+                <a:pos x="connsiteX3" y="connsiteY3"/>
+              </a:cxn>
+              <a:cxn ang="0">
+                <a:pos x="connsiteX4" y="connsiteY4"/>
+              </a:cxn>
+              <a:cxn ang="0">
+                <a:pos x="connsiteX5" y="connsiteY5"/>
+              </a:cxn>
+              <a:cxn ang="0">
+                <a:pos x="connsiteX6" y="connsiteY6"/>
+              </a:cxn>
+              <a:cxn ang="0">
+                <a:pos x="connsiteX7" y="connsiteY7"/>
+              </a:cxn>
+              <a:cxn ang="0">
+                <a:pos x="connsiteX8" y="connsiteY8"/>
+              </a:cxn>
+              <a:cxn ang="0">
+                <a:pos x="connsiteX9" y="connsiteY9"/>
+              </a:cxn>
+              <a:cxn ang="0">
+                <a:pos x="connsiteX10" y="connsiteY10"/>
+              </a:cxn>
+              <a:cxn ang="0">
+                <a:pos x="connsiteX11" y="connsiteY11"/>
+              </a:cxn>
+              <a:cxn ang="0">
+                <a:pos x="connsiteX12" y="connsiteY12"/>
+              </a:cxn>
+              <a:cxn ang="0">
+                <a:pos x="connsiteX13" y="connsiteY13"/>
+              </a:cxn>
+              <a:cxn ang="0">
+                <a:pos x="connsiteX14" y="connsiteY14"/>
+              </a:cxn>
+              <a:cxn ang="0">
+                <a:pos x="connsiteX15" y="connsiteY15"/>
+              </a:cxn>
+              <a:cxn ang="0">
+                <a:pos x="connsiteX16" y="connsiteY16"/>
+              </a:cxn>
+            </a:cxnLst>
+            <a:rect l="l" t="t" r="r" b="b"/>
+            <a:pathLst>
+              <a:path w="4243589" h="18288" fill="none" extrusionOk="0">
+                <a:moveTo>
+                  <a:pt x="0" y="0"/>
+                </a:moveTo>
+                <a:cubicBezTo>
+                  <a:pt x="157351" y="-15653"/>
+                  <a:pt x="378877" y="-5828"/>
+                  <a:pt x="563791" y="0"/>
+                </a:cubicBezTo>
+                <a:cubicBezTo>
+                  <a:pt x="748705" y="5828"/>
+                  <a:pt x="905659" y="-5525"/>
+                  <a:pt x="1042710" y="0"/>
+                </a:cubicBezTo>
+                <a:cubicBezTo>
+                  <a:pt x="1179761" y="5525"/>
+                  <a:pt x="1356845" y="-21288"/>
+                  <a:pt x="1564066" y="0"/>
+                </a:cubicBezTo>
+                <a:cubicBezTo>
+                  <a:pt x="1771287" y="21288"/>
+                  <a:pt x="1912099" y="25135"/>
+                  <a:pt x="2212729" y="0"/>
+                </a:cubicBezTo>
+                <a:cubicBezTo>
+                  <a:pt x="2513359" y="-25135"/>
+                  <a:pt x="2514918" y="-27119"/>
+                  <a:pt x="2776520" y="0"/>
+                </a:cubicBezTo>
+                <a:cubicBezTo>
+                  <a:pt x="3038122" y="27119"/>
+                  <a:pt x="3178771" y="18116"/>
+                  <a:pt x="3297875" y="0"/>
+                </a:cubicBezTo>
+                <a:cubicBezTo>
+                  <a:pt x="3416980" y="-18116"/>
+                  <a:pt x="4012240" y="-40869"/>
+                  <a:pt x="4243589" y="0"/>
+                </a:cubicBezTo>
+                <a:cubicBezTo>
+                  <a:pt x="4243987" y="7429"/>
+                  <a:pt x="4243569" y="10822"/>
+                  <a:pt x="4243589" y="18288"/>
+                </a:cubicBezTo>
+                <a:cubicBezTo>
+                  <a:pt x="4112949" y="-2855"/>
+                  <a:pt x="3928037" y="1831"/>
+                  <a:pt x="3637362" y="18288"/>
+                </a:cubicBezTo>
+                <a:cubicBezTo>
+                  <a:pt x="3346687" y="34745"/>
+                  <a:pt x="3254446" y="26669"/>
+                  <a:pt x="3116007" y="18288"/>
+                </a:cubicBezTo>
+                <a:cubicBezTo>
+                  <a:pt x="2977569" y="9907"/>
+                  <a:pt x="2620228" y="28873"/>
+                  <a:pt x="2424908" y="18288"/>
+                </a:cubicBezTo>
+                <a:cubicBezTo>
+                  <a:pt x="2229588" y="7703"/>
+                  <a:pt x="2088287" y="-3854"/>
+                  <a:pt x="1861117" y="18288"/>
+                </a:cubicBezTo>
+                <a:cubicBezTo>
+                  <a:pt x="1633947" y="40430"/>
+                  <a:pt x="1502447" y="-871"/>
+                  <a:pt x="1382198" y="18288"/>
+                </a:cubicBezTo>
+                <a:cubicBezTo>
+                  <a:pt x="1261949" y="37447"/>
+                  <a:pt x="1045440" y="28353"/>
+                  <a:pt x="733535" y="18288"/>
+                </a:cubicBezTo>
+                <a:cubicBezTo>
+                  <a:pt x="421630" y="8223"/>
+                  <a:pt x="341257" y="-18359"/>
+                  <a:pt x="0" y="18288"/>
+                </a:cubicBezTo>
+                <a:cubicBezTo>
+                  <a:pt x="-591" y="13205"/>
+                  <a:pt x="-663" y="6329"/>
+                  <a:pt x="0" y="0"/>
+                </a:cubicBezTo>
+                <a:close/>
+              </a:path>
+              <a:path w="4243589" h="18288" stroke="0" extrusionOk="0">
+                <a:moveTo>
+                  <a:pt x="0" y="0"/>
+                </a:moveTo>
+                <a:cubicBezTo>
+                  <a:pt x="128164" y="17204"/>
+                  <a:pt x="312653" y="1129"/>
+                  <a:pt x="563791" y="0"/>
+                </a:cubicBezTo>
+                <a:cubicBezTo>
+                  <a:pt x="814929" y="-1129"/>
+                  <a:pt x="837271" y="8503"/>
+                  <a:pt x="1042710" y="0"/>
+                </a:cubicBezTo>
+                <a:cubicBezTo>
+                  <a:pt x="1248149" y="-8503"/>
+                  <a:pt x="1588432" y="-28862"/>
+                  <a:pt x="1733809" y="0"/>
+                </a:cubicBezTo>
+                <a:cubicBezTo>
+                  <a:pt x="1879186" y="28862"/>
+                  <a:pt x="2052815" y="5974"/>
+                  <a:pt x="2297600" y="0"/>
+                </a:cubicBezTo>
+                <a:cubicBezTo>
+                  <a:pt x="2542385" y="-5974"/>
+                  <a:pt x="2699960" y="-23550"/>
+                  <a:pt x="2861391" y="0"/>
+                </a:cubicBezTo>
+                <a:cubicBezTo>
+                  <a:pt x="3022822" y="23550"/>
+                  <a:pt x="3390411" y="25272"/>
+                  <a:pt x="3552490" y="0"/>
+                </a:cubicBezTo>
+                <a:cubicBezTo>
+                  <a:pt x="3714569" y="-25272"/>
+                  <a:pt x="3950585" y="-31327"/>
+                  <a:pt x="4243589" y="0"/>
+                </a:cubicBezTo>
+                <a:cubicBezTo>
+                  <a:pt x="4242703" y="5429"/>
+                  <a:pt x="4244410" y="14046"/>
+                  <a:pt x="4243589" y="18288"/>
+                </a:cubicBezTo>
+                <a:cubicBezTo>
+                  <a:pt x="4130424" y="-1240"/>
+                  <a:pt x="3932803" y="42249"/>
+                  <a:pt x="3722234" y="18288"/>
+                </a:cubicBezTo>
+                <a:cubicBezTo>
+                  <a:pt x="3511665" y="-5673"/>
+                  <a:pt x="3269903" y="45994"/>
+                  <a:pt x="3116007" y="18288"/>
+                </a:cubicBezTo>
+                <a:cubicBezTo>
+                  <a:pt x="2962111" y="-9418"/>
+                  <a:pt x="2744280" y="23224"/>
+                  <a:pt x="2509780" y="18288"/>
+                </a:cubicBezTo>
+                <a:cubicBezTo>
+                  <a:pt x="2275280" y="13352"/>
+                  <a:pt x="2066059" y="43664"/>
+                  <a:pt x="1945989" y="18288"/>
+                </a:cubicBezTo>
+                <a:cubicBezTo>
+                  <a:pt x="1825919" y="-7088"/>
+                  <a:pt x="1407329" y="12616"/>
+                  <a:pt x="1254890" y="18288"/>
+                </a:cubicBezTo>
+                <a:cubicBezTo>
+                  <a:pt x="1102451" y="23960"/>
+                  <a:pt x="837950" y="31673"/>
+                  <a:pt x="563791" y="18288"/>
+                </a:cubicBezTo>
+                <a:cubicBezTo>
+                  <a:pt x="289632" y="4903"/>
+                  <a:pt x="132768" y="7105"/>
+                  <a:pt x="0" y="18288"/>
+                </a:cubicBezTo>
+                <a:cubicBezTo>
+                  <a:pt x="668" y="13665"/>
+                  <a:pt x="578" y="5675"/>
+                  <a:pt x="0" y="0"/>
+                </a:cubicBezTo>
+                <a:close/>
+              </a:path>
+            </a:pathLst>
+          </a:custGeom>
+          <a:solidFill>
+            <a:srgbClr val="FFFFFF"/>
+          </a:solidFill>
+          <a:ln w="41275" cap="rnd">
+            <a:solidFill>
+              <a:srgbClr val="FFFFFF"/>
+            </a:solidFill>
+            <a:round/>
+            <a:extLst>
+              <a:ext uri="{C807C97D-BFC1-408E-A445-0C87EB9F89A2}">
+                <ask:lineSketchStyleProps xmlns:ask="http://schemas.microsoft.com/office/drawing/2018/sketchyshapes" sd="1219033472">
+                  <a:prstGeom prst="rect">
+                    <a:avLst/>
+                  </a:prstGeom>
+                  <ask:type>
+                    <ask:lineSketchFreehand/>
+                  </ask:type>
+                </ask:lineSketchStyleProps>
+              </a:ext>
+            </a:extLst>
+          </a:ln>
+        </p:spPr>
+        <p:style>
+          <a:lnRef idx="2">
+            <a:schemeClr val="accent1">
+              <a:shade val="50000"/>
+            </a:schemeClr>
+          </a:lnRef>
+          <a:fillRef idx="1">
+            <a:schemeClr val="accent1"/>
+          </a:fillRef>
+          <a:effectRef idx="0">
+            <a:schemeClr val="accent1"/>
+          </a:effectRef>
+          <a:fontRef idx="minor">
+            <a:schemeClr val="lt1"/>
+          </a:fontRef>
+        </p:style>
+        <p:txBody>
+          <a:bodyPr rtlCol="0" anchor="ctr"/>
+          <a:lstStyle/>
+          <a:p>
+            <a:pPr algn="ctr"/>
+            <a:endParaRPr lang="en-US"/>
+          </a:p>
+        </p:txBody>
+      </p:sp>
+    </p:spTree>
+    <p:extLst>
+      <p:ext uri="{BB962C8B-B14F-4D97-AF65-F5344CB8AC3E}">
+        <p14:creationId xmlns:p14="http://schemas.microsoft.com/office/powerpoint/2010/main" val="3878383734"/>
       </p:ext>
     </p:extLst>
   </p:cSld>

</xml_diff>